<commit_message>
Added fitted model files and changed code to update the location of those files
</commit_message>
<xml_diff>
--- a/Final Presentation.pptx
+++ b/Final Presentation.pptx
@@ -112,7 +112,7 @@
   </p:defaultTextStyle>
   <p:extLst>
     <p:ext uri="{EFAFB233-063F-42B5-8137-9DF3F51BA10A}">
-      <p15:sldGuideLst xmlns:p15="http://schemas.microsoft.com/office/powerpoint/2012/main" xmlns="">
+      <p15:sldGuideLst xmlns:p15="http://schemas.microsoft.com/office/powerpoint/2012/main">
         <p15:guide id="1" orient="horz" pos="2160">
           <p15:clr>
             <a:srgbClr val="A4A3A4"/>
@@ -211,7 +211,7 @@
           <a:p>
             <a:fld id="{B5466D7D-005C-4C90-9802-341E9F587257}" type="datetimeFigureOut">
               <a:rPr lang="en-US" smtClean="0"/>
-              <a:t>12/8/15</a:t>
+              <a:t>12/8/2015</a:t>
             </a:fld>
             <a:endParaRPr lang="en-US"/>
           </a:p>
@@ -790,7 +790,7 @@
             <a:fld id="{1D8BD707-D9CF-40AE-B4C6-C98DA3205C09}" type="datetimeFigureOut">
               <a:rPr lang="en-US" smtClean="0"/>
               <a:pPr/>
-              <a:t>12/8/15</a:t>
+              <a:t>12/8/2015</a:t>
             </a:fld>
             <a:endParaRPr lang="en-US"/>
           </a:p>
@@ -1000,7 +1000,7 @@
             <a:fld id="{1D8BD707-D9CF-40AE-B4C6-C98DA3205C09}" type="datetimeFigureOut">
               <a:rPr lang="en-US" smtClean="0"/>
               <a:pPr/>
-              <a:t>12/8/15</a:t>
+              <a:t>12/8/2015</a:t>
             </a:fld>
             <a:endParaRPr lang="en-US"/>
           </a:p>
@@ -1258,7 +1258,7 @@
             <a:fld id="{1D8BD707-D9CF-40AE-B4C6-C98DA3205C09}" type="datetimeFigureOut">
               <a:rPr lang="en-US" smtClean="0"/>
               <a:pPr/>
-              <a:t>12/8/15</a:t>
+              <a:t>12/8/2015</a:t>
             </a:fld>
             <a:endParaRPr lang="en-US"/>
           </a:p>
@@ -1430,7 +1430,7 @@
             <a:fld id="{1D8BD707-D9CF-40AE-B4C6-C98DA3205C09}" type="datetimeFigureOut">
               <a:rPr lang="en-US" smtClean="0"/>
               <a:pPr/>
-              <a:t>12/8/15</a:t>
+              <a:t>12/8/2015</a:t>
             </a:fld>
             <a:endParaRPr lang="en-US"/>
           </a:p>
@@ -1775,7 +1775,7 @@
             <a:fld id="{1D8BD707-D9CF-40AE-B4C6-C98DA3205C09}" type="datetimeFigureOut">
               <a:rPr lang="en-US" smtClean="0"/>
               <a:pPr/>
-              <a:t>12/8/15</a:t>
+              <a:t>12/8/2015</a:t>
             </a:fld>
             <a:endParaRPr lang="en-US"/>
           </a:p>
@@ -2052,7 +2052,7 @@
             <a:fld id="{1D8BD707-D9CF-40AE-B4C6-C98DA3205C09}" type="datetimeFigureOut">
               <a:rPr lang="en-US" smtClean="0"/>
               <a:pPr/>
-              <a:t>12/8/15</a:t>
+              <a:t>12/8/2015</a:t>
             </a:fld>
             <a:endParaRPr lang="en-US"/>
           </a:p>
@@ -2433,7 +2433,7 @@
             <a:fld id="{1D8BD707-D9CF-40AE-B4C6-C98DA3205C09}" type="datetimeFigureOut">
               <a:rPr lang="en-US" smtClean="0"/>
               <a:pPr/>
-              <a:t>12/8/15</a:t>
+              <a:t>12/8/2015</a:t>
             </a:fld>
             <a:endParaRPr lang="en-US"/>
           </a:p>
@@ -2553,7 +2553,7 @@
             <a:fld id="{1D8BD707-D9CF-40AE-B4C6-C98DA3205C09}" type="datetimeFigureOut">
               <a:rPr lang="en-US" smtClean="0"/>
               <a:pPr/>
-              <a:t>12/8/15</a:t>
+              <a:t>12/8/2015</a:t>
             </a:fld>
             <a:endParaRPr lang="en-US"/>
           </a:p>
@@ -2726,7 +2726,7 @@
             <a:fld id="{1D8BD707-D9CF-40AE-B4C6-C98DA3205C09}" type="datetimeFigureOut">
               <a:rPr lang="en-US" smtClean="0"/>
               <a:pPr/>
-              <a:t>12/8/15</a:t>
+              <a:t>12/8/2015</a:t>
             </a:fld>
             <a:endParaRPr lang="en-US"/>
           </a:p>
@@ -3082,7 +3082,7 @@
             <a:fld id="{1D8BD707-D9CF-40AE-B4C6-C98DA3205C09}" type="datetimeFigureOut">
               <a:rPr lang="en-US" smtClean="0"/>
               <a:pPr/>
-              <a:t>12/8/15</a:t>
+              <a:t>12/8/2015</a:t>
             </a:fld>
             <a:endParaRPr lang="en-US"/>
           </a:p>
@@ -3466,7 +3466,7 @@
             <a:fld id="{1D8BD707-D9CF-40AE-B4C6-C98DA3205C09}" type="datetimeFigureOut">
               <a:rPr lang="en-US" smtClean="0"/>
               <a:pPr/>
-              <a:t>12/8/15</a:t>
+              <a:t>12/8/2015</a:t>
             </a:fld>
             <a:endParaRPr lang="en-US"/>
           </a:p>
@@ -3755,7 +3755,7 @@
             <a:fld id="{1D8BD707-D9CF-40AE-B4C6-C98DA3205C09}" type="datetimeFigureOut">
               <a:rPr lang="en-US" smtClean="0"/>
               <a:pPr/>
-              <a:t>12/8/15</a:t>
+              <a:t>12/8/2015</a:t>
             </a:fld>
             <a:endParaRPr lang="en-US"/>
           </a:p>
@@ -4334,14 +4334,7 @@
                 <a:latin typeface="Times New Roman"/>
                 <a:cs typeface="Times New Roman"/>
               </a:rPr>
-              <a:t>Pixel </a:t>
-            </a:r>
-            <a:r>
-              <a:rPr lang="en-US" dirty="0" smtClean="0">
-                <a:latin typeface="Times New Roman"/>
-                <a:cs typeface="Times New Roman"/>
-              </a:rPr>
-              <a:t>Dawgs</a:t>
+              <a:t>Pixel Dawgs</a:t>
             </a:r>
           </a:p>
         </p:txBody>
@@ -4540,7 +4533,7 @@
   <p:timing>
     <p:tnLst>
       <p:par>
-        <p:cTn xmlns:p14="http://schemas.microsoft.com/office/powerpoint/2010/main" id="1" dur="indefinite" restart="never" nodeType="tmRoot"/>
+        <p:cTn id="1" dur="indefinite" restart="never" nodeType="tmRoot"/>
       </p:par>
     </p:tnLst>
   </p:timing>
@@ -4639,10 +4632,6 @@
               </a:rPr>
               <a:t>Data Acquisition and Data Engineering</a:t>
             </a:r>
-            <a:endParaRPr lang="en-US" sz="2400" dirty="0" smtClean="0">
-              <a:latin typeface="Times New Roman"/>
-              <a:cs typeface="Times New Roman"/>
-            </a:endParaRPr>
           </a:p>
           <a:p>
             <a:pPr>
@@ -4695,10 +4684,6 @@
               </a:rPr>
               <a:t>Sobel filtering</a:t>
             </a:r>
-            <a:endParaRPr lang="en-US" sz="1900" dirty="0" smtClean="0">
-              <a:latin typeface="Times New Roman"/>
-              <a:cs typeface="Times New Roman"/>
-            </a:endParaRPr>
           </a:p>
           <a:p>
             <a:pPr>
@@ -4738,10 +4723,6 @@
               </a:rPr>
               <a:t>Supervised learning using SVM</a:t>
             </a:r>
-            <a:endParaRPr lang="en-US" sz="1900" dirty="0" smtClean="0">
-              <a:latin typeface="Times New Roman"/>
-              <a:cs typeface="Times New Roman"/>
-            </a:endParaRPr>
           </a:p>
           <a:p>
             <a:pPr>
@@ -4808,7 +4789,7 @@
   <p:timing>
     <p:tnLst>
       <p:par>
-        <p:cTn xmlns:p14="http://schemas.microsoft.com/office/powerpoint/2010/main" id="1" dur="indefinite" restart="never" nodeType="tmRoot"/>
+        <p:cTn id="1" dur="indefinite" restart="never" nodeType="tmRoot"/>
       </p:par>
     </p:tnLst>
   </p:timing>
@@ -4895,8 +4876,29 @@
             </a:pPr>
             <a:r>
               <a:rPr lang="en-US" sz="2000" dirty="0" smtClean="0"/>
-              <a:t>A tool that will show what does a image have based on the visual content.</a:t>
-            </a:r>
+              <a:t>A tool that will show what </a:t>
+            </a:r>
+            <a:r>
+              <a:rPr lang="en-US" sz="2000" dirty="0" smtClean="0"/>
+              <a:t>an </a:t>
+            </a:r>
+            <a:r>
+              <a:rPr lang="en-US" sz="2000" dirty="0" smtClean="0"/>
+              <a:t>image </a:t>
+            </a:r>
+            <a:r>
+              <a:rPr lang="en-US" sz="2000" dirty="0" smtClean="0"/>
+              <a:t>has </a:t>
+            </a:r>
+            <a:r>
+              <a:rPr lang="en-US" sz="2000" dirty="0" smtClean="0"/>
+              <a:t>based on the visual </a:t>
+            </a:r>
+            <a:r>
+              <a:rPr lang="en-US" sz="2000" dirty="0" smtClean="0"/>
+              <a:t>content</a:t>
+            </a:r>
+            <a:endParaRPr lang="en-US" sz="2000" dirty="0" smtClean="0"/>
           </a:p>
           <a:p>
             <a:pPr marL="461963" indent="-461963">
@@ -4921,8 +4923,13 @@
             </a:pPr>
             <a:r>
               <a:rPr lang="en-US" sz="2000" dirty="0" smtClean="0"/>
-              <a:t>Simplification in categorizing the images.</a:t>
-            </a:r>
+              <a:t>Simplification in categorizing the </a:t>
+            </a:r>
+            <a:r>
+              <a:rPr lang="en-US" sz="2000" dirty="0" smtClean="0"/>
+              <a:t>images</a:t>
+            </a:r>
+            <a:endParaRPr lang="en-US" sz="2000" dirty="0" smtClean="0"/>
           </a:p>
           <a:p>
             <a:pPr marL="911225" lvl="1" indent="-450850">
@@ -4947,8 +4954,21 @@
             </a:pPr>
             <a:r>
               <a:rPr lang="en-US" sz="2000" dirty="0" smtClean="0"/>
-              <a:t>Its really cool!!!</a:t>
-            </a:r>
+              <a:t>It’s </a:t>
+            </a:r>
+            <a:r>
+              <a:rPr lang="en-US" sz="2000" dirty="0" smtClean="0"/>
+              <a:t>really </a:t>
+            </a:r>
+            <a:r>
+              <a:rPr lang="en-US" sz="2000" smtClean="0"/>
+              <a:t>cool</a:t>
+            </a:r>
+            <a:r>
+              <a:rPr lang="en-US" sz="2000" smtClean="0"/>
+              <a:t>!!!</a:t>
+            </a:r>
+            <a:endParaRPr lang="en-US" sz="2000" dirty="0" smtClean="0"/>
           </a:p>
           <a:p>
             <a:pPr lvl="1">
@@ -5041,11 +5061,11 @@
             </a:pPr>
             <a:r>
               <a:rPr lang="en-US" sz="2200" dirty="0"/>
-              <a:t>Open source raw data is provided by Yahoo-Flickr.</a:t>
-            </a:r>
-            <a:r>
-              <a:rPr lang="x-none" sz="2200" dirty="0"/>
-              <a:t> </a:t>
+              <a:t>Open source raw data is provided by </a:t>
+            </a:r>
+            <a:r>
+              <a:rPr lang="en-US" sz="2200" dirty="0" smtClean="0"/>
+              <a:t>Yahoo-Flickr</a:t>
             </a:r>
             <a:endParaRPr lang="en-US" sz="2200" dirty="0" smtClean="0"/>
           </a:p>
@@ -5069,8 +5089,13 @@
             </a:pPr>
             <a:r>
               <a:rPr lang="en-US" sz="2000" dirty="0" smtClean="0"/>
-              <a:t>Image URL  (10 files, 5GB each).</a:t>
-            </a:r>
+              <a:t>Image URL  (10 files, 5GB each</a:t>
+            </a:r>
+            <a:r>
+              <a:rPr lang="en-US" sz="2000" dirty="0" smtClean="0"/>
+              <a:t>)</a:t>
+            </a:r>
+            <a:endParaRPr lang="en-US" sz="2000" dirty="0" smtClean="0"/>
           </a:p>
           <a:p>
             <a:pPr marL="937451" lvl="2" indent="-461963">
@@ -5082,8 +5107,13 @@
             </a:pPr>
             <a:r>
               <a:rPr lang="en-US" sz="1600" dirty="0" smtClean="0"/>
-              <a:t>File contains image ID and the associated url to download the file.</a:t>
-            </a:r>
+              <a:t>File contains image ID and the associated url to download the </a:t>
+            </a:r>
+            <a:r>
+              <a:rPr lang="en-US" sz="1600" dirty="0" smtClean="0"/>
+              <a:t>file</a:t>
+            </a:r>
+            <a:endParaRPr lang="en-US" sz="1600" dirty="0" smtClean="0"/>
           </a:p>
           <a:p>
             <a:pPr marL="911225" lvl="2" indent="-436563">
@@ -5099,12 +5129,13 @@
             </a:r>
             <a:r>
               <a:rPr lang="en-US" sz="1600" dirty="0"/>
-              <a:t>images were downloaded</a:t>
+              <a:t>images were </a:t>
             </a:r>
             <a:r>
               <a:rPr lang="en-US" sz="1600" dirty="0" smtClean="0"/>
-              <a:t>.</a:t>
-            </a:r>
+              <a:t>downloaded</a:t>
+            </a:r>
+            <a:endParaRPr lang="en-US" sz="1600" dirty="0" smtClean="0"/>
           </a:p>
           <a:p>
             <a:pPr marL="911225" lvl="2" indent="-436563">
@@ -5116,7 +5147,11 @@
             </a:pPr>
             <a:r>
               <a:rPr lang="en-US" sz="1600" dirty="0" smtClean="0"/>
-              <a:t>Small subset was used due to computational limitation.</a:t>
+              <a:t>Small subset was used due to computational </a:t>
+            </a:r>
+            <a:r>
+              <a:rPr lang="en-US" sz="1600" dirty="0" smtClean="0"/>
+              <a:t>limitation</a:t>
             </a:r>
             <a:endParaRPr lang="en-US" sz="1600" dirty="0"/>
           </a:p>
@@ -5139,8 +5174,13 @@
             </a:pPr>
             <a:r>
               <a:rPr lang="en-US" sz="2000" dirty="0" smtClean="0"/>
-              <a:t>Auto-tags (14GB).</a:t>
-            </a:r>
+              <a:t>Auto-tags (14GB</a:t>
+            </a:r>
+            <a:r>
+              <a:rPr lang="en-US" sz="2000" dirty="0" smtClean="0"/>
+              <a:t>)</a:t>
+            </a:r>
+            <a:endParaRPr lang="en-US" sz="2000" dirty="0" smtClean="0"/>
           </a:p>
           <a:p>
             <a:pPr marL="937451" lvl="2" indent="-461963">
@@ -5152,8 +5192,13 @@
             </a:pPr>
             <a:r>
               <a:rPr lang="en-US" sz="1600" dirty="0" smtClean="0"/>
-              <a:t>File contains image ID and associated auto-tags.</a:t>
-            </a:r>
+              <a:t>File contains image ID and associated </a:t>
+            </a:r>
+            <a:r>
+              <a:rPr lang="en-US" sz="1600" dirty="0" smtClean="0"/>
+              <a:t>auto-tags</a:t>
+            </a:r>
+            <a:endParaRPr lang="en-US" sz="1600" dirty="0" smtClean="0"/>
           </a:p>
           <a:p>
             <a:pPr marL="937451" lvl="2" indent="-461963">
@@ -5165,8 +5210,13 @@
             </a:pPr>
             <a:r>
               <a:rPr lang="en-US" sz="1600" dirty="0" smtClean="0"/>
-              <a:t>File was divided in two different files, because traditional processing was hard on such a large file.</a:t>
-            </a:r>
+              <a:t>File was divided in two different files, because traditional processing was hard on such a large </a:t>
+            </a:r>
+            <a:r>
+              <a:rPr lang="en-US" sz="1600" dirty="0" smtClean="0"/>
+              <a:t>file</a:t>
+            </a:r>
+            <a:endParaRPr lang="en-US" sz="1600" dirty="0" smtClean="0"/>
           </a:p>
           <a:p>
             <a:pPr marL="937451" lvl="2" indent="-461963">
@@ -5178,8 +5228,13 @@
             </a:pPr>
             <a:r>
               <a:rPr lang="en-US" sz="1600" dirty="0" smtClean="0"/>
-              <a:t>Index column was changed to auto-tags, now all the auto-tags are associated with the image ID.</a:t>
-            </a:r>
+              <a:t>Index column was changed to auto-tags, now all the auto-tags are associated with the image </a:t>
+            </a:r>
+            <a:r>
+              <a:rPr lang="en-US" sz="1600" dirty="0" smtClean="0"/>
+              <a:t>ID</a:t>
+            </a:r>
+            <a:endParaRPr lang="en-US" sz="1600" dirty="0" smtClean="0"/>
           </a:p>
           <a:p>
             <a:pPr marL="292608" lvl="1" indent="0">
@@ -5482,7 +5537,7 @@
   <a:extraClrSchemeLst/>
   <a:extLst>
     <a:ext uri="{05A4C25C-085E-4340-85A3-A5531E510DB2}">
-      <thm15:themeFamily xmlns:thm15="http://schemas.microsoft.com/office/thememl/2012/main" xmlns="" name="Retrospect" id="{5F128B03-DCCA-4EEB-AB3B-CF2899314A46}" vid="{3F1AAB62-24C6-49D2-8E01-B56FAC9A3DCD}"/>
+      <thm15:themeFamily xmlns:thm15="http://schemas.microsoft.com/office/thememl/2012/main" name="Retrospect" id="{5F128B03-DCCA-4EEB-AB3B-CF2899314A46}" vid="{3F1AAB62-24C6-49D2-8E01-B56FAC9A3DCD}"/>
     </a:ext>
   </a:extLst>
 </a:theme>
@@ -5743,7 +5798,7 @@
   <a:extraClrSchemeLst/>
   <a:extLst>
     <a:ext uri="{05A4C25C-085E-4340-85A3-A5531E510DB2}">
-      <thm15:themeFamily xmlns:thm15="http://schemas.microsoft.com/office/thememl/2012/main" xmlns="" name="Office Theme" id="{62F939B6-93AF-4DB8-9C6B-D6C7DFDC589F}" vid="{4A3C46E8-61CC-4603-A589-7422A47A8E4A}"/>
+      <thm15:themeFamily xmlns:thm15="http://schemas.microsoft.com/office/thememl/2012/main" name="Office Theme" id="{62F939B6-93AF-4DB8-9C6B-D6C7DFDC589F}" vid="{4A3C46E8-61CC-4603-A589-7422A47A8E4A}"/>
     </a:ext>
   </a:extLst>
 </a:theme>

</xml_diff>

<commit_message>
Added Shreya's slide to the presentation
</commit_message>
<xml_diff>
--- a/Final Presentation.pptx
+++ b/Final Presentation.pptx
@@ -5,13 +5,14 @@
     <p:sldMasterId id="2147483660" r:id="rId1"/>
   </p:sldMasterIdLst>
   <p:notesMasterIdLst>
-    <p:notesMasterId r:id="rId6"/>
+    <p:notesMasterId r:id="rId7"/>
   </p:notesMasterIdLst>
   <p:sldIdLst>
     <p:sldId id="256" r:id="rId2"/>
     <p:sldId id="258" r:id="rId3"/>
     <p:sldId id="267" r:id="rId4"/>
     <p:sldId id="268" r:id="rId5"/>
+    <p:sldId id="269" r:id="rId6"/>
   </p:sldIdLst>
   <p:sldSz cx="9144000" cy="6858000" type="screen4x3"/>
   <p:notesSz cx="6858000" cy="9144000"/>
@@ -4876,29 +4877,8 @@
             </a:pPr>
             <a:r>
               <a:rPr lang="en-US" sz="2000" dirty="0" smtClean="0"/>
-              <a:t>A tool that will show what </a:t>
-            </a:r>
-            <a:r>
-              <a:rPr lang="en-US" sz="2000" dirty="0" smtClean="0"/>
-              <a:t>an </a:t>
-            </a:r>
-            <a:r>
-              <a:rPr lang="en-US" sz="2000" dirty="0" smtClean="0"/>
-              <a:t>image </a:t>
-            </a:r>
-            <a:r>
-              <a:rPr lang="en-US" sz="2000" dirty="0" smtClean="0"/>
-              <a:t>has </a:t>
-            </a:r>
-            <a:r>
-              <a:rPr lang="en-US" sz="2000" dirty="0" smtClean="0"/>
-              <a:t>based on the visual </a:t>
-            </a:r>
-            <a:r>
-              <a:rPr lang="en-US" sz="2000" dirty="0" smtClean="0"/>
-              <a:t>content</a:t>
-            </a:r>
-            <a:endParaRPr lang="en-US" sz="2000" dirty="0" smtClean="0"/>
+              <a:t>A tool that will show what an image has based on the visual content</a:t>
+            </a:r>
           </a:p>
           <a:p>
             <a:pPr marL="461963" indent="-461963">
@@ -4923,13 +4903,8 @@
             </a:pPr>
             <a:r>
               <a:rPr lang="en-US" sz="2000" dirty="0" smtClean="0"/>
-              <a:t>Simplification in categorizing the </a:t>
-            </a:r>
-            <a:r>
-              <a:rPr lang="en-US" sz="2000" dirty="0" smtClean="0"/>
-              <a:t>images</a:t>
-            </a:r>
-            <a:endParaRPr lang="en-US" sz="2000" dirty="0" smtClean="0"/>
+              <a:t>Simplification in categorizing the images</a:t>
+            </a:r>
           </a:p>
           <a:p>
             <a:pPr marL="911225" lvl="1" indent="-450850">
@@ -4954,19 +4929,11 @@
             </a:pPr>
             <a:r>
               <a:rPr lang="en-US" sz="2000" dirty="0" smtClean="0"/>
-              <a:t>It’s </a:t>
-            </a:r>
-            <a:r>
-              <a:rPr lang="en-US" sz="2000" dirty="0" smtClean="0"/>
-              <a:t>really </a:t>
+              <a:t>It’s really </a:t>
             </a:r>
             <a:r>
               <a:rPr lang="en-US" sz="2000" smtClean="0"/>
-              <a:t>cool</a:t>
-            </a:r>
-            <a:r>
-              <a:rPr lang="en-US" sz="2000" smtClean="0"/>
-              <a:t>!!!</a:t>
+              <a:t>cool!!!</a:t>
             </a:r>
             <a:endParaRPr lang="en-US" sz="2000" dirty="0" smtClean="0"/>
           </a:p>
@@ -5067,7 +5034,6 @@
               <a:rPr lang="en-US" sz="2200" dirty="0" smtClean="0"/>
               <a:t>Yahoo-Flickr</a:t>
             </a:r>
-            <a:endParaRPr lang="en-US" sz="2200" dirty="0" smtClean="0"/>
           </a:p>
           <a:p>
             <a:pPr marL="754571" lvl="1" indent="-461963">
@@ -5089,13 +5055,8 @@
             </a:pPr>
             <a:r>
               <a:rPr lang="en-US" sz="2000" dirty="0" smtClean="0"/>
-              <a:t>Image URL  (10 files, 5GB each</a:t>
-            </a:r>
-            <a:r>
-              <a:rPr lang="en-US" sz="2000" dirty="0" smtClean="0"/>
-              <a:t>)</a:t>
-            </a:r>
-            <a:endParaRPr lang="en-US" sz="2000" dirty="0" smtClean="0"/>
+              <a:t>Image URL  (10 files, 5GB each)</a:t>
+            </a:r>
           </a:p>
           <a:p>
             <a:pPr marL="937451" lvl="2" indent="-461963">
@@ -5107,13 +5068,8 @@
             </a:pPr>
             <a:r>
               <a:rPr lang="en-US" sz="1600" dirty="0" smtClean="0"/>
-              <a:t>File contains image ID and the associated url to download the </a:t>
-            </a:r>
-            <a:r>
-              <a:rPr lang="en-US" sz="1600" dirty="0" smtClean="0"/>
-              <a:t>file</a:t>
-            </a:r>
-            <a:endParaRPr lang="en-US" sz="1600" dirty="0" smtClean="0"/>
+              <a:t>File contains image ID and the associated url to download the file</a:t>
+            </a:r>
           </a:p>
           <a:p>
             <a:pPr marL="911225" lvl="2" indent="-436563">
@@ -5135,7 +5091,6 @@
               <a:rPr lang="en-US" sz="1600" dirty="0" smtClean="0"/>
               <a:t>downloaded</a:t>
             </a:r>
-            <a:endParaRPr lang="en-US" sz="1600" dirty="0" smtClean="0"/>
           </a:p>
           <a:p>
             <a:pPr marL="911225" lvl="2" indent="-436563">
@@ -5147,11 +5102,7 @@
             </a:pPr>
             <a:r>
               <a:rPr lang="en-US" sz="1600" dirty="0" smtClean="0"/>
-              <a:t>Small subset was used due to computational </a:t>
-            </a:r>
-            <a:r>
-              <a:rPr lang="en-US" sz="1600" dirty="0" smtClean="0"/>
-              <a:t>limitation</a:t>
+              <a:t>Small subset was used due to computational limitation</a:t>
             </a:r>
             <a:endParaRPr lang="en-US" sz="1600" dirty="0"/>
           </a:p>
@@ -5174,13 +5125,8 @@
             </a:pPr>
             <a:r>
               <a:rPr lang="en-US" sz="2000" dirty="0" smtClean="0"/>
-              <a:t>Auto-tags (14GB</a:t>
-            </a:r>
-            <a:r>
-              <a:rPr lang="en-US" sz="2000" dirty="0" smtClean="0"/>
-              <a:t>)</a:t>
-            </a:r>
-            <a:endParaRPr lang="en-US" sz="2000" dirty="0" smtClean="0"/>
+              <a:t>Auto-tags (14GB)</a:t>
+            </a:r>
           </a:p>
           <a:p>
             <a:pPr marL="937451" lvl="2" indent="-461963">
@@ -5192,13 +5138,8 @@
             </a:pPr>
             <a:r>
               <a:rPr lang="en-US" sz="1600" dirty="0" smtClean="0"/>
-              <a:t>File contains image ID and associated </a:t>
-            </a:r>
-            <a:r>
-              <a:rPr lang="en-US" sz="1600" dirty="0" smtClean="0"/>
-              <a:t>auto-tags</a:t>
-            </a:r>
-            <a:endParaRPr lang="en-US" sz="1600" dirty="0" smtClean="0"/>
+              <a:t>File contains image ID and associated auto-tags</a:t>
+            </a:r>
           </a:p>
           <a:p>
             <a:pPr marL="937451" lvl="2" indent="-461963">
@@ -5210,13 +5151,8 @@
             </a:pPr>
             <a:r>
               <a:rPr lang="en-US" sz="1600" dirty="0" smtClean="0"/>
-              <a:t>File was divided in two different files, because traditional processing was hard on such a large </a:t>
-            </a:r>
-            <a:r>
-              <a:rPr lang="en-US" sz="1600" dirty="0" smtClean="0"/>
-              <a:t>file</a:t>
-            </a:r>
-            <a:endParaRPr lang="en-US" sz="1600" dirty="0" smtClean="0"/>
+              <a:t>File was divided in two different files, because traditional processing was hard on such a large file</a:t>
+            </a:r>
           </a:p>
           <a:p>
             <a:pPr marL="937451" lvl="2" indent="-461963">
@@ -5228,13 +5164,8 @@
             </a:pPr>
             <a:r>
               <a:rPr lang="en-US" sz="1600" dirty="0" smtClean="0"/>
-              <a:t>Index column was changed to auto-tags, now all the auto-tags are associated with the image </a:t>
-            </a:r>
-            <a:r>
-              <a:rPr lang="en-US" sz="1600" dirty="0" smtClean="0"/>
-              <a:t>ID</a:t>
-            </a:r>
-            <a:endParaRPr lang="en-US" sz="1600" dirty="0" smtClean="0"/>
+              <a:t>Index column was changed to auto-tags, now all the auto-tags are associated with the image ID</a:t>
+            </a:r>
           </a:p>
           <a:p>
             <a:pPr marL="292608" lvl="1" indent="0">
@@ -5251,6 +5182,183 @@
     <p:extLst>
       <p:ext uri="{BB962C8B-B14F-4D97-AF65-F5344CB8AC3E}">
         <p14:creationId xmlns:p14="http://schemas.microsoft.com/office/powerpoint/2010/main" val="3061013647"/>
+      </p:ext>
+    </p:extLst>
+  </p:cSld>
+  <p:clrMapOvr>
+    <a:masterClrMapping/>
+  </p:clrMapOvr>
+</p:sld>
+</file>
+
+<file path=ppt/slides/slide5.xml><?xml version="1.0" encoding="utf-8"?>
+<p:sld xmlns:a="http://schemas.openxmlformats.org/drawingml/2006/main" xmlns:r="http://schemas.openxmlformats.org/officeDocument/2006/relationships" xmlns:p="http://schemas.openxmlformats.org/presentationml/2006/main">
+  <p:cSld>
+    <p:spTree>
+      <p:nvGrpSpPr>
+        <p:cNvPr id="1" name=""/>
+        <p:cNvGrpSpPr/>
+        <p:nvPr/>
+      </p:nvGrpSpPr>
+      <p:grpSpPr>
+        <a:xfrm>
+          <a:off x="0" y="0"/>
+          <a:ext cx="0" cy="0"/>
+          <a:chOff x="0" y="0"/>
+          <a:chExt cx="0" cy="0"/>
+        </a:xfrm>
+      </p:grpSpPr>
+      <p:sp>
+        <p:nvSpPr>
+          <p:cNvPr id="2" name="Title 1"/>
+          <p:cNvSpPr>
+            <a:spLocks noGrp="1"/>
+          </p:cNvSpPr>
+          <p:nvPr>
+            <p:ph type="title"/>
+          </p:nvPr>
+        </p:nvSpPr>
+        <p:spPr/>
+        <p:txBody>
+          <a:bodyPr>
+            <a:normAutofit fontScale="90000"/>
+          </a:bodyPr>
+          <a:lstStyle/>
+          <a:p>
+            <a:r>
+              <a:rPr lang="en-US" dirty="0" smtClean="0"/>
+              <a:t>Machine Learning – Supervised Learning Using SVM</a:t>
+            </a:r>
+            <a:endParaRPr lang="en-US" dirty="0"/>
+          </a:p>
+        </p:txBody>
+      </p:sp>
+      <p:sp>
+        <p:nvSpPr>
+          <p:cNvPr id="3" name="Content Placeholder 2"/>
+          <p:cNvSpPr>
+            <a:spLocks noGrp="1"/>
+          </p:cNvSpPr>
+          <p:nvPr>
+            <p:ph idx="1"/>
+          </p:nvPr>
+        </p:nvSpPr>
+        <p:spPr/>
+        <p:txBody>
+          <a:bodyPr>
+            <a:normAutofit fontScale="92500" lnSpcReduction="10000"/>
+          </a:bodyPr>
+          <a:lstStyle/>
+          <a:p>
+            <a:pPr marL="251460" indent="-342900">
+              <a:buFont typeface="Wingdings" panose="05000000000000000000" pitchFamily="2" charset="2"/>
+              <a:buChar char="v"/>
+            </a:pPr>
+            <a:r>
+              <a:rPr lang="en-US" dirty="0" smtClean="0"/>
+              <a:t>SVM stands for Support Vector Machine</a:t>
+            </a:r>
+          </a:p>
+          <a:p>
+            <a:pPr marL="251460" indent="-342900">
+              <a:buFont typeface="Wingdings" panose="05000000000000000000" pitchFamily="2" charset="2"/>
+              <a:buChar char="v"/>
+            </a:pPr>
+            <a:r>
+              <a:rPr lang="en-US" dirty="0"/>
+              <a:t>Used SVM classification </a:t>
+            </a:r>
+            <a:r>
+              <a:rPr lang="en-US" dirty="0" smtClean="0"/>
+              <a:t>library </a:t>
+            </a:r>
+            <a:r>
+              <a:rPr lang="en-US" dirty="0"/>
+              <a:t>from </a:t>
+            </a:r>
+            <a:r>
+              <a:rPr lang="en-US" dirty="0" err="1"/>
+              <a:t>sci</a:t>
+            </a:r>
+            <a:r>
+              <a:rPr lang="en-US" dirty="0"/>
+              <a:t>-kit learn </a:t>
+            </a:r>
+          </a:p>
+          <a:p>
+            <a:pPr marL="251460" indent="-342900">
+              <a:buFont typeface="Wingdings" panose="05000000000000000000" pitchFamily="2" charset="2"/>
+              <a:buChar char="v"/>
+            </a:pPr>
+            <a:r>
+              <a:rPr lang="en-US" dirty="0" smtClean="0"/>
+              <a:t>This type of classification is based on feature vectors generated by processing  the segments in each image</a:t>
+            </a:r>
+          </a:p>
+          <a:p>
+            <a:pPr marL="251460" indent="-342900">
+              <a:buFont typeface="Wingdings" panose="05000000000000000000" pitchFamily="2" charset="2"/>
+              <a:buChar char="v"/>
+            </a:pPr>
+            <a:r>
+              <a:rPr lang="en-US" dirty="0" smtClean="0"/>
+              <a:t>The feature vector we used is a 1-D vector of numerical values representing a segment of an image</a:t>
+            </a:r>
+          </a:p>
+          <a:p>
+            <a:pPr marL="251460" indent="-342900">
+              <a:buFont typeface="Wingdings" panose="05000000000000000000" pitchFamily="2" charset="2"/>
+              <a:buChar char="v"/>
+            </a:pPr>
+            <a:r>
+              <a:rPr lang="en-US" dirty="0" smtClean="0"/>
+              <a:t>Each vector is associated with an image tag, e.g. “sky”</a:t>
+            </a:r>
+          </a:p>
+          <a:p>
+            <a:pPr marL="251460" indent="-342900">
+              <a:buFont typeface="Wingdings" panose="05000000000000000000" pitchFamily="2" charset="2"/>
+              <a:buChar char="v"/>
+            </a:pPr>
+            <a:r>
+              <a:rPr lang="en-US" dirty="0" smtClean="0"/>
+              <a:t>Using the feature vectors along with the labels for each tag, a machine learning model was created</a:t>
+            </a:r>
+          </a:p>
+          <a:p>
+            <a:pPr marL="251460" indent="-342900">
+              <a:buFont typeface="Wingdings" panose="05000000000000000000" pitchFamily="2" charset="2"/>
+              <a:buChar char="v"/>
+            </a:pPr>
+            <a:r>
+              <a:rPr lang="en-US" dirty="0" smtClean="0"/>
+              <a:t>This model was then used to predict what tags the new image could have</a:t>
+            </a:r>
+          </a:p>
+          <a:p>
+            <a:pPr marL="251460" indent="-342900">
+              <a:buFont typeface="Wingdings" panose="05000000000000000000" pitchFamily="2" charset="2"/>
+              <a:buChar char="v"/>
+            </a:pPr>
+            <a:r>
+              <a:rPr lang="en-US" dirty="0" smtClean="0"/>
+              <a:t>The </a:t>
+            </a:r>
+            <a:r>
+              <a:rPr lang="en-US" smtClean="0"/>
+              <a:t>SVM provided </a:t>
+            </a:r>
+            <a:r>
+              <a:rPr lang="en-US" dirty="0" smtClean="0"/>
+              <a:t>tags and probabilities associated with each tag</a:t>
+            </a:r>
+          </a:p>
+        </p:txBody>
+      </p:sp>
+    </p:spTree>
+    <p:extLst>
+      <p:ext uri="{BB962C8B-B14F-4D97-AF65-F5344CB8AC3E}">
+        <p14:creationId xmlns:p14="http://schemas.microsoft.com/office/powerpoint/2010/main" val="3160203011"/>
       </p:ext>
     </p:extLst>
   </p:cSld>

</xml_diff>

<commit_message>
Made changes to Shreya's slide
</commit_message>
<xml_diff>
--- a/Final Presentation.pptx
+++ b/Final Presentation.pptx
@@ -212,7 +212,7 @@
           <a:p>
             <a:fld id="{B5466D7D-005C-4C90-9802-341E9F587257}" type="datetimeFigureOut">
               <a:rPr lang="en-US" smtClean="0"/>
-              <a:t>12/8/2015</a:t>
+              <a:t>12/9/2015</a:t>
             </a:fld>
             <a:endParaRPr lang="en-US"/>
           </a:p>
@@ -791,7 +791,7 @@
             <a:fld id="{1D8BD707-D9CF-40AE-B4C6-C98DA3205C09}" type="datetimeFigureOut">
               <a:rPr lang="en-US" smtClean="0"/>
               <a:pPr/>
-              <a:t>12/8/2015</a:t>
+              <a:t>12/9/2015</a:t>
             </a:fld>
             <a:endParaRPr lang="en-US"/>
           </a:p>
@@ -1001,7 +1001,7 @@
             <a:fld id="{1D8BD707-D9CF-40AE-B4C6-C98DA3205C09}" type="datetimeFigureOut">
               <a:rPr lang="en-US" smtClean="0"/>
               <a:pPr/>
-              <a:t>12/8/2015</a:t>
+              <a:t>12/9/2015</a:t>
             </a:fld>
             <a:endParaRPr lang="en-US"/>
           </a:p>
@@ -1259,7 +1259,7 @@
             <a:fld id="{1D8BD707-D9CF-40AE-B4C6-C98DA3205C09}" type="datetimeFigureOut">
               <a:rPr lang="en-US" smtClean="0"/>
               <a:pPr/>
-              <a:t>12/8/2015</a:t>
+              <a:t>12/9/2015</a:t>
             </a:fld>
             <a:endParaRPr lang="en-US"/>
           </a:p>
@@ -1431,7 +1431,7 @@
             <a:fld id="{1D8BD707-D9CF-40AE-B4C6-C98DA3205C09}" type="datetimeFigureOut">
               <a:rPr lang="en-US" smtClean="0"/>
               <a:pPr/>
-              <a:t>12/8/2015</a:t>
+              <a:t>12/9/2015</a:t>
             </a:fld>
             <a:endParaRPr lang="en-US"/>
           </a:p>
@@ -1776,7 +1776,7 @@
             <a:fld id="{1D8BD707-D9CF-40AE-B4C6-C98DA3205C09}" type="datetimeFigureOut">
               <a:rPr lang="en-US" smtClean="0"/>
               <a:pPr/>
-              <a:t>12/8/2015</a:t>
+              <a:t>12/9/2015</a:t>
             </a:fld>
             <a:endParaRPr lang="en-US"/>
           </a:p>
@@ -2053,7 +2053,7 @@
             <a:fld id="{1D8BD707-D9CF-40AE-B4C6-C98DA3205C09}" type="datetimeFigureOut">
               <a:rPr lang="en-US" smtClean="0"/>
               <a:pPr/>
-              <a:t>12/8/2015</a:t>
+              <a:t>12/9/2015</a:t>
             </a:fld>
             <a:endParaRPr lang="en-US"/>
           </a:p>
@@ -2434,7 +2434,7 @@
             <a:fld id="{1D8BD707-D9CF-40AE-B4C6-C98DA3205C09}" type="datetimeFigureOut">
               <a:rPr lang="en-US" smtClean="0"/>
               <a:pPr/>
-              <a:t>12/8/2015</a:t>
+              <a:t>12/9/2015</a:t>
             </a:fld>
             <a:endParaRPr lang="en-US"/>
           </a:p>
@@ -2554,7 +2554,7 @@
             <a:fld id="{1D8BD707-D9CF-40AE-B4C6-C98DA3205C09}" type="datetimeFigureOut">
               <a:rPr lang="en-US" smtClean="0"/>
               <a:pPr/>
-              <a:t>12/8/2015</a:t>
+              <a:t>12/9/2015</a:t>
             </a:fld>
             <a:endParaRPr lang="en-US"/>
           </a:p>
@@ -2727,7 +2727,7 @@
             <a:fld id="{1D8BD707-D9CF-40AE-B4C6-C98DA3205C09}" type="datetimeFigureOut">
               <a:rPr lang="en-US" smtClean="0"/>
               <a:pPr/>
-              <a:t>12/8/2015</a:t>
+              <a:t>12/9/2015</a:t>
             </a:fld>
             <a:endParaRPr lang="en-US"/>
           </a:p>
@@ -3083,7 +3083,7 @@
             <a:fld id="{1D8BD707-D9CF-40AE-B4C6-C98DA3205C09}" type="datetimeFigureOut">
               <a:rPr lang="en-US" smtClean="0"/>
               <a:pPr/>
-              <a:t>12/8/2015</a:t>
+              <a:t>12/9/2015</a:t>
             </a:fld>
             <a:endParaRPr lang="en-US"/>
           </a:p>
@@ -3467,7 +3467,7 @@
             <a:fld id="{1D8BD707-D9CF-40AE-B4C6-C98DA3205C09}" type="datetimeFigureOut">
               <a:rPr lang="en-US" smtClean="0"/>
               <a:pPr/>
-              <a:t>12/8/2015</a:t>
+              <a:t>12/9/2015</a:t>
             </a:fld>
             <a:endParaRPr lang="en-US"/>
           </a:p>
@@ -3756,7 +3756,7 @@
             <a:fld id="{1D8BD707-D9CF-40AE-B4C6-C98DA3205C09}" type="datetimeFigureOut">
               <a:rPr lang="en-US" smtClean="0"/>
               <a:pPr/>
-              <a:t>12/8/2015</a:t>
+              <a:t>12/9/2015</a:t>
             </a:fld>
             <a:endParaRPr lang="en-US"/>
           </a:p>
@@ -5277,13 +5277,14 @@
               <a:t>from </a:t>
             </a:r>
             <a:r>
-              <a:rPr lang="en-US" dirty="0" err="1"/>
-              <a:t>sci</a:t>
-            </a:r>
-            <a:r>
-              <a:rPr lang="en-US" dirty="0"/>
-              <a:t>-kit learn </a:t>
-            </a:r>
+              <a:rPr lang="en-US" dirty="0" err="1" smtClean="0"/>
+              <a:t>scikit</a:t>
+            </a:r>
+            <a:r>
+              <a:rPr lang="en-US" smtClean="0"/>
+              <a:t>-learn </a:t>
+            </a:r>
+            <a:endParaRPr lang="en-US" dirty="0"/>
           </a:p>
           <a:p>
             <a:pPr marL="251460" indent="-342900">
@@ -5342,15 +5343,7 @@
             </a:pPr>
             <a:r>
               <a:rPr lang="en-US" dirty="0" smtClean="0"/>
-              <a:t>The </a:t>
-            </a:r>
-            <a:r>
-              <a:rPr lang="en-US" smtClean="0"/>
-              <a:t>SVM provided </a:t>
-            </a:r>
-            <a:r>
-              <a:rPr lang="en-US" dirty="0" smtClean="0"/>
-              <a:t>tags and probabilities associated with each tag</a:t>
+              <a:t>The SVM provided tags and probabilities associated with each tag</a:t>
             </a:r>
           </a:p>
         </p:txBody>

</xml_diff>

<commit_message>
Adding completed final presentation and some images used in the presentation
</commit_message>
<xml_diff>
--- a/Final Presentation.pptx
+++ b/Final Presentation.pptx
@@ -5,14 +5,27 @@
     <p:sldMasterId id="2147483660" r:id="rId1"/>
   </p:sldMasterIdLst>
   <p:notesMasterIdLst>
-    <p:notesMasterId r:id="rId7"/>
+    <p:notesMasterId r:id="rId20"/>
   </p:notesMasterIdLst>
   <p:sldIdLst>
     <p:sldId id="256" r:id="rId2"/>
     <p:sldId id="258" r:id="rId3"/>
     <p:sldId id="267" r:id="rId4"/>
     <p:sldId id="268" r:id="rId5"/>
-    <p:sldId id="269" r:id="rId6"/>
+    <p:sldId id="270" r:id="rId6"/>
+    <p:sldId id="271" r:id="rId7"/>
+    <p:sldId id="273" r:id="rId8"/>
+    <p:sldId id="274" r:id="rId9"/>
+    <p:sldId id="276" r:id="rId10"/>
+    <p:sldId id="277" r:id="rId11"/>
+    <p:sldId id="278" r:id="rId12"/>
+    <p:sldId id="279" r:id="rId13"/>
+    <p:sldId id="280" r:id="rId14"/>
+    <p:sldId id="281" r:id="rId15"/>
+    <p:sldId id="282" r:id="rId16"/>
+    <p:sldId id="283" r:id="rId17"/>
+    <p:sldId id="284" r:id="rId18"/>
+    <p:sldId id="285" r:id="rId19"/>
   </p:sldIdLst>
   <p:sldSz cx="9144000" cy="6858000" type="screen4x3"/>
   <p:notesSz cx="6858000" cy="9144000"/>
@@ -555,6 +568,90 @@
     <p:extLst>
       <p:ext uri="{BB962C8B-B14F-4D97-AF65-F5344CB8AC3E}">
         <p14:creationId xmlns:p14="http://schemas.microsoft.com/office/powerpoint/2010/main" val="2289485113"/>
+      </p:ext>
+    </p:extLst>
+  </p:cSld>
+  <p:clrMapOvr>
+    <a:masterClrMapping/>
+  </p:clrMapOvr>
+</p:notes>
+</file>
+
+<file path=ppt/notesSlides/notesSlide2.xml><?xml version="1.0" encoding="utf-8"?>
+<p:notes xmlns:a="http://schemas.openxmlformats.org/drawingml/2006/main" xmlns:r="http://schemas.openxmlformats.org/officeDocument/2006/relationships" xmlns:p="http://schemas.openxmlformats.org/presentationml/2006/main">
+  <p:cSld>
+    <p:spTree>
+      <p:nvGrpSpPr>
+        <p:cNvPr id="1" name=""/>
+        <p:cNvGrpSpPr/>
+        <p:nvPr/>
+      </p:nvGrpSpPr>
+      <p:grpSpPr>
+        <a:xfrm>
+          <a:off x="0" y="0"/>
+          <a:ext cx="0" cy="0"/>
+          <a:chOff x="0" y="0"/>
+          <a:chExt cx="0" cy="0"/>
+        </a:xfrm>
+      </p:grpSpPr>
+      <p:sp>
+        <p:nvSpPr>
+          <p:cNvPr id="2" name="Slide Image Placeholder 1"/>
+          <p:cNvSpPr>
+            <a:spLocks noGrp="1" noRot="1" noChangeAspect="1"/>
+          </p:cNvSpPr>
+          <p:nvPr>
+            <p:ph type="sldImg"/>
+          </p:nvPr>
+        </p:nvSpPr>
+        <p:spPr/>
+      </p:sp>
+      <p:sp>
+        <p:nvSpPr>
+          <p:cNvPr id="3" name="Notes Placeholder 2"/>
+          <p:cNvSpPr>
+            <a:spLocks noGrp="1"/>
+          </p:cNvSpPr>
+          <p:nvPr>
+            <p:ph type="body" idx="1"/>
+          </p:nvPr>
+        </p:nvSpPr>
+        <p:spPr/>
+        <p:txBody>
+          <a:bodyPr/>
+          <a:lstStyle/>
+          <a:p>
+            <a:endParaRPr lang="en-US"/>
+          </a:p>
+        </p:txBody>
+      </p:sp>
+      <p:sp>
+        <p:nvSpPr>
+          <p:cNvPr id="4" name="Slide Number Placeholder 3"/>
+          <p:cNvSpPr>
+            <a:spLocks noGrp="1"/>
+          </p:cNvSpPr>
+          <p:nvPr>
+            <p:ph type="sldNum" sz="quarter" idx="10"/>
+          </p:nvPr>
+        </p:nvSpPr>
+        <p:spPr/>
+        <p:txBody>
+          <a:bodyPr/>
+          <a:lstStyle/>
+          <a:p>
+            <a:fld id="{AA67C303-44B4-4F14-B7F8-DAF30C7A7664}" type="slidenum">
+              <a:rPr lang="en-US" smtClean="0"/>
+              <a:t>14</a:t>
+            </a:fld>
+            <a:endParaRPr lang="en-US"/>
+          </a:p>
+        </p:txBody>
+      </p:sp>
+    </p:spTree>
+    <p:extLst>
+      <p:ext uri="{BB962C8B-B14F-4D97-AF65-F5344CB8AC3E}">
+        <p14:creationId xmlns:p14="http://schemas.microsoft.com/office/powerpoint/2010/main" val="1653783501"/>
       </p:ext>
     </p:extLst>
   </p:cSld>
@@ -4303,13 +4400,11 @@
           <a:p>
             <a:r>
               <a:rPr lang="en-US" dirty="0" smtClean="0">
-                <a:latin typeface="Times New Roman"/>
                 <a:cs typeface="Times New Roman"/>
               </a:rPr>
               <a:t>Image Classifier</a:t>
             </a:r>
             <a:endParaRPr lang="en-US" dirty="0">
-              <a:latin typeface="Times New Roman"/>
               <a:cs typeface="Times New Roman"/>
             </a:endParaRPr>
           </a:p>
@@ -4331,8 +4426,7 @@
           <a:lstStyle/>
           <a:p>
             <a:r>
-              <a:rPr lang="en-US" dirty="0" smtClean="0">
-                <a:latin typeface="Times New Roman"/>
+              <a:rPr lang="en-US" b="1" dirty="0" smtClean="0">
                 <a:cs typeface="Times New Roman"/>
               </a:rPr>
               <a:t>Pixel Dawgs</a:t>
@@ -4384,7 +4478,7 @@
         <p:spPr>
           <a:xfrm>
             <a:off x="762000" y="4876800"/>
-            <a:ext cx="2185214" cy="1412694"/>
+            <a:ext cx="1965410" cy="1399742"/>
           </a:xfrm>
           <a:prstGeom prst="rect">
             <a:avLst/>
@@ -4405,13 +4499,13 @@
               <a:buChar char="•"/>
             </a:pPr>
             <a:r>
-              <a:rPr lang="en-US" dirty="0" smtClean="0">
+              <a:rPr lang="en-US" b="1" dirty="0" smtClean="0">
                 <a:solidFill>
                   <a:schemeClr val="accent6">
                     <a:lumMod val="75000"/>
                   </a:schemeClr>
                 </a:solidFill>
-                <a:latin typeface="Times New Roman"/>
+                <a:latin typeface="+mj-lt"/>
                 <a:cs typeface="Times New Roman"/>
               </a:rPr>
               <a:t>NICK ROSETTI </a:t>
@@ -4426,13 +4520,13 @@
               <a:buChar char="•"/>
             </a:pPr>
             <a:r>
-              <a:rPr lang="en-US" dirty="0" smtClean="0">
+              <a:rPr lang="en-US" b="1" dirty="0" smtClean="0">
                 <a:solidFill>
                   <a:schemeClr val="accent6">
                     <a:lumMod val="75000"/>
                   </a:schemeClr>
                 </a:solidFill>
-                <a:latin typeface="Times New Roman"/>
+                <a:latin typeface="+mj-lt"/>
                 <a:cs typeface="Times New Roman"/>
               </a:rPr>
               <a:t>VEERA KARRI</a:t>
@@ -4447,13 +4541,13 @@
               <a:buChar char="•"/>
             </a:pPr>
             <a:r>
-              <a:rPr lang="en-US" dirty="0" smtClean="0">
+              <a:rPr lang="en-US" b="1" dirty="0" smtClean="0">
                 <a:solidFill>
                   <a:schemeClr val="accent6">
                     <a:lumMod val="75000"/>
                   </a:schemeClr>
                 </a:solidFill>
-                <a:latin typeface="Times New Roman"/>
+                <a:latin typeface="+mj-lt"/>
                 <a:cs typeface="Times New Roman"/>
               </a:rPr>
               <a:t>MANISH BORSE </a:t>
@@ -4468,24 +4562,24 @@
               <a:buChar char="•"/>
             </a:pPr>
             <a:r>
-              <a:rPr lang="en-US" dirty="0" smtClean="0">
+              <a:rPr lang="en-US" b="1" dirty="0" smtClean="0">
                 <a:solidFill>
                   <a:schemeClr val="accent6">
                     <a:lumMod val="75000"/>
                   </a:schemeClr>
                 </a:solidFill>
-                <a:latin typeface="Times New Roman"/>
+                <a:latin typeface="+mj-lt"/>
                 <a:cs typeface="Times New Roman"/>
               </a:rPr>
               <a:t>SHREYA GUPTA</a:t>
             </a:r>
-            <a:endParaRPr lang="en-US" dirty="0">
+            <a:endParaRPr lang="en-US" b="1" dirty="0">
               <a:solidFill>
                 <a:schemeClr val="accent6">
                   <a:lumMod val="75000"/>
                 </a:schemeClr>
               </a:solidFill>
-              <a:latin typeface="Times New Roman"/>
+              <a:latin typeface="+mj-lt"/>
               <a:cs typeface="Times New Roman"/>
             </a:endParaRPr>
           </a:p>
@@ -4541,6 +4635,1386 @@
 </p:sld>
 </file>
 
+<file path=ppt/slides/slide10.xml><?xml version="1.0" encoding="utf-8"?>
+<p:sld xmlns:a="http://schemas.openxmlformats.org/drawingml/2006/main" xmlns:r="http://schemas.openxmlformats.org/officeDocument/2006/relationships" xmlns:p="http://schemas.openxmlformats.org/presentationml/2006/main">
+  <p:cSld>
+    <p:spTree>
+      <p:nvGrpSpPr>
+        <p:cNvPr id="1" name=""/>
+        <p:cNvGrpSpPr/>
+        <p:nvPr/>
+      </p:nvGrpSpPr>
+      <p:grpSpPr>
+        <a:xfrm>
+          <a:off x="0" y="0"/>
+          <a:ext cx="0" cy="0"/>
+          <a:chOff x="0" y="0"/>
+          <a:chExt cx="0" cy="0"/>
+        </a:xfrm>
+      </p:grpSpPr>
+      <p:sp>
+        <p:nvSpPr>
+          <p:cNvPr id="2" name="Title 1"/>
+          <p:cNvSpPr>
+            <a:spLocks noGrp="1"/>
+          </p:cNvSpPr>
+          <p:nvPr>
+            <p:ph type="title"/>
+          </p:nvPr>
+        </p:nvSpPr>
+        <p:spPr/>
+        <p:txBody>
+          <a:bodyPr/>
+          <a:lstStyle/>
+          <a:p>
+            <a:r>
+              <a:rPr lang="en-US" dirty="0" smtClean="0"/>
+              <a:t>Manual Tagging</a:t>
+            </a:r>
+            <a:endParaRPr lang="en-US" dirty="0"/>
+          </a:p>
+        </p:txBody>
+      </p:sp>
+      <p:pic>
+        <p:nvPicPr>
+          <p:cNvPr id="4" name="Content Placeholder 3"/>
+          <p:cNvPicPr>
+            <a:picLocks noGrp="1" noChangeAspect="1"/>
+          </p:cNvPicPr>
+          <p:nvPr>
+            <p:ph idx="1"/>
+          </p:nvPr>
+        </p:nvPicPr>
+        <p:blipFill>
+          <a:blip r:embed="rId2">
+            <a:extLst>
+              <a:ext uri="{28A0092B-C50C-407E-A947-70E740481C1C}">
+                <a14:useLocalDpi xmlns:a14="http://schemas.microsoft.com/office/drawing/2010/main" val="0"/>
+              </a:ext>
+            </a:extLst>
+          </a:blip>
+          <a:stretch>
+            <a:fillRect/>
+          </a:stretch>
+        </p:blipFill>
+        <p:spPr>
+          <a:xfrm>
+            <a:off x="1170629" y="1846263"/>
+            <a:ext cx="6847191" cy="4022725"/>
+          </a:xfrm>
+        </p:spPr>
+      </p:pic>
+    </p:spTree>
+    <p:extLst>
+      <p:ext uri="{BB962C8B-B14F-4D97-AF65-F5344CB8AC3E}">
+        <p14:creationId xmlns:p14="http://schemas.microsoft.com/office/powerpoint/2010/main" val="2266089944"/>
+      </p:ext>
+    </p:extLst>
+  </p:cSld>
+  <p:clrMapOvr>
+    <a:masterClrMapping/>
+  </p:clrMapOvr>
+</p:sld>
+</file>
+
+<file path=ppt/slides/slide11.xml><?xml version="1.0" encoding="utf-8"?>
+<p:sld xmlns:a="http://schemas.openxmlformats.org/drawingml/2006/main" xmlns:r="http://schemas.openxmlformats.org/officeDocument/2006/relationships" xmlns:p="http://schemas.openxmlformats.org/presentationml/2006/main">
+  <p:cSld>
+    <p:spTree>
+      <p:nvGrpSpPr>
+        <p:cNvPr id="1" name=""/>
+        <p:cNvGrpSpPr/>
+        <p:nvPr/>
+      </p:nvGrpSpPr>
+      <p:grpSpPr>
+        <a:xfrm>
+          <a:off x="0" y="0"/>
+          <a:ext cx="0" cy="0"/>
+          <a:chOff x="0" y="0"/>
+          <a:chExt cx="0" cy="0"/>
+        </a:xfrm>
+      </p:grpSpPr>
+      <p:sp>
+        <p:nvSpPr>
+          <p:cNvPr id="2" name="Title 1"/>
+          <p:cNvSpPr>
+            <a:spLocks noGrp="1"/>
+          </p:cNvSpPr>
+          <p:nvPr>
+            <p:ph type="title"/>
+          </p:nvPr>
+        </p:nvSpPr>
+        <p:spPr/>
+        <p:txBody>
+          <a:bodyPr/>
+          <a:lstStyle/>
+          <a:p>
+            <a:r>
+              <a:rPr lang="en-US" dirty="0" smtClean="0"/>
+              <a:t>Feature Vector Training</a:t>
+            </a:r>
+            <a:endParaRPr lang="en-US" dirty="0"/>
+          </a:p>
+        </p:txBody>
+      </p:sp>
+      <p:sp>
+        <p:nvSpPr>
+          <p:cNvPr id="3" name="Content Placeholder 2"/>
+          <p:cNvSpPr>
+            <a:spLocks noGrp="1"/>
+          </p:cNvSpPr>
+          <p:nvPr>
+            <p:ph idx="1"/>
+          </p:nvPr>
+        </p:nvSpPr>
+        <p:spPr/>
+        <p:txBody>
+          <a:bodyPr>
+            <a:normAutofit lnSpcReduction="10000"/>
+          </a:bodyPr>
+          <a:lstStyle/>
+          <a:p>
+            <a:pPr marL="461963" indent="-461963">
+              <a:lnSpc>
+                <a:spcPct val="150000"/>
+              </a:lnSpc>
+              <a:buFont typeface="Wingdings" charset="2"/>
+              <a:buChar char="v"/>
+            </a:pPr>
+            <a:r>
+              <a:rPr lang="en-US" sz="2400" dirty="0" smtClean="0"/>
+              <a:t>Feature Vector Generation</a:t>
+            </a:r>
+            <a:endParaRPr lang="en-US" dirty="0"/>
+          </a:p>
+          <a:p>
+            <a:pPr marL="911225" lvl="1" indent="-449263">
+              <a:lnSpc>
+                <a:spcPct val="150000"/>
+              </a:lnSpc>
+              <a:buFont typeface="Wingdings" charset="2"/>
+              <a:buChar char="Ø"/>
+            </a:pPr>
+            <a:r>
+              <a:rPr lang="en-US" sz="2000" dirty="0" smtClean="0"/>
+              <a:t>Every segment is represented by a 6-D vector which contains median and standard deviation values for each color channel</a:t>
+            </a:r>
+          </a:p>
+          <a:p>
+            <a:pPr marL="461963" indent="-461963">
+              <a:lnSpc>
+                <a:spcPct val="150000"/>
+              </a:lnSpc>
+              <a:buFont typeface="Wingdings" charset="2"/>
+              <a:buChar char="v"/>
+            </a:pPr>
+            <a:r>
+              <a:rPr lang="en-US" sz="2400" dirty="0" smtClean="0"/>
+              <a:t>Why not PCA or an alternative method?</a:t>
+            </a:r>
+          </a:p>
+          <a:p>
+            <a:pPr marL="911225" lvl="1" indent="-449263">
+              <a:lnSpc>
+                <a:spcPct val="150000"/>
+              </a:lnSpc>
+              <a:buFont typeface="Wingdings" charset="2"/>
+              <a:buChar char="Ø"/>
+            </a:pPr>
+            <a:r>
+              <a:rPr lang="en-US" sz="2000" dirty="0" smtClean="0"/>
+              <a:t>Simplicity and poor initial performance</a:t>
+            </a:r>
+            <a:endParaRPr lang="en-US" dirty="0" smtClean="0"/>
+          </a:p>
+          <a:p>
+            <a:pPr marL="461963" indent="-461963">
+              <a:lnSpc>
+                <a:spcPct val="150000"/>
+              </a:lnSpc>
+              <a:buFont typeface="Wingdings" charset="2"/>
+              <a:buChar char="v"/>
+            </a:pPr>
+            <a:r>
+              <a:rPr lang="en-US" sz="2200" dirty="0" smtClean="0"/>
+              <a:t>All segments associated with all tags have individual feature vectors</a:t>
+            </a:r>
+            <a:endParaRPr lang="en-US" sz="2200" dirty="0"/>
+          </a:p>
+          <a:p>
+            <a:endParaRPr lang="en-US" dirty="0"/>
+          </a:p>
+        </p:txBody>
+      </p:sp>
+    </p:spTree>
+    <p:extLst>
+      <p:ext uri="{BB962C8B-B14F-4D97-AF65-F5344CB8AC3E}">
+        <p14:creationId xmlns:p14="http://schemas.microsoft.com/office/powerpoint/2010/main" val="820805698"/>
+      </p:ext>
+    </p:extLst>
+  </p:cSld>
+  <p:clrMapOvr>
+    <a:masterClrMapping/>
+  </p:clrMapOvr>
+</p:sld>
+</file>
+
+<file path=ppt/slides/slide12.xml><?xml version="1.0" encoding="utf-8"?>
+<p:sld xmlns:a="http://schemas.openxmlformats.org/drawingml/2006/main" xmlns:r="http://schemas.openxmlformats.org/officeDocument/2006/relationships" xmlns:p="http://schemas.openxmlformats.org/presentationml/2006/main">
+  <p:cSld>
+    <p:spTree>
+      <p:nvGrpSpPr>
+        <p:cNvPr id="1" name=""/>
+        <p:cNvGrpSpPr/>
+        <p:nvPr/>
+      </p:nvGrpSpPr>
+      <p:grpSpPr>
+        <a:xfrm>
+          <a:off x="0" y="0"/>
+          <a:ext cx="0" cy="0"/>
+          <a:chOff x="0" y="0"/>
+          <a:chExt cx="0" cy="0"/>
+        </a:xfrm>
+      </p:grpSpPr>
+      <p:sp>
+        <p:nvSpPr>
+          <p:cNvPr id="2" name="Title 1"/>
+          <p:cNvSpPr>
+            <a:spLocks noGrp="1"/>
+          </p:cNvSpPr>
+          <p:nvPr>
+            <p:ph type="title"/>
+          </p:nvPr>
+        </p:nvSpPr>
+        <p:spPr/>
+        <p:txBody>
+          <a:bodyPr/>
+          <a:lstStyle/>
+          <a:p>
+            <a:r>
+              <a:rPr lang="en-US" dirty="0" smtClean="0"/>
+              <a:t>Feature Vector Example</a:t>
+            </a:r>
+            <a:endParaRPr lang="en-US" dirty="0"/>
+          </a:p>
+        </p:txBody>
+      </p:sp>
+      <p:sp>
+        <p:nvSpPr>
+          <p:cNvPr id="3" name="Content Placeholder 2"/>
+          <p:cNvSpPr>
+            <a:spLocks noGrp="1"/>
+          </p:cNvSpPr>
+          <p:nvPr>
+            <p:ph idx="1"/>
+          </p:nvPr>
+        </p:nvSpPr>
+        <p:spPr/>
+        <p:txBody>
+          <a:bodyPr>
+            <a:normAutofit fontScale="77500" lnSpcReduction="20000"/>
+          </a:bodyPr>
+          <a:lstStyle/>
+          <a:p>
+            <a:pPr marL="461963" indent="-461963">
+              <a:lnSpc>
+                <a:spcPct val="150000"/>
+              </a:lnSpc>
+              <a:buFont typeface="Wingdings" charset="2"/>
+              <a:buChar char="v"/>
+            </a:pPr>
+            <a:r>
+              <a:rPr lang="en-US" sz="2400" dirty="0"/>
+              <a:t>"lights": </a:t>
+            </a:r>
+            <a:r>
+              <a:rPr lang="en-US" sz="2400" dirty="0" smtClean="0"/>
+              <a:t>                                                                                                                 </a:t>
+            </a:r>
+            <a:r>
+              <a:rPr lang="en-US" sz="2300" b="1" dirty="0" smtClean="0"/>
+              <a:t>1: </a:t>
+            </a:r>
+            <a:r>
+              <a:rPr lang="en-US" sz="2300" dirty="0" smtClean="0"/>
+              <a:t>[[</a:t>
+            </a:r>
+            <a:r>
+              <a:rPr lang="en-US" sz="2300" dirty="0"/>
+              <a:t>63.75916230366492, 25.59738219895288, 4.737696335078534, 35.24376752046357, 18.071460634995603, 5.451047541570147], </a:t>
+            </a:r>
+            <a:r>
+              <a:rPr lang="en-US" sz="2300" dirty="0" smtClean="0"/>
+              <a:t>             </a:t>
+            </a:r>
+            <a:r>
+              <a:rPr lang="en-US" sz="2300" b="1" dirty="0" smtClean="0"/>
+              <a:t>2: </a:t>
+            </a:r>
+            <a:r>
+              <a:rPr lang="en-US" sz="2300" dirty="0" smtClean="0"/>
+              <a:t>[63.75916230366492</a:t>
+            </a:r>
+            <a:r>
+              <a:rPr lang="en-US" sz="2300" dirty="0"/>
+              <a:t>, 25.59738219895288, 4.737696335078534, 35.24376752046357, 18.071460634995603, 5.451047541570147], </a:t>
+            </a:r>
+            <a:r>
+              <a:rPr lang="en-US" sz="2300" dirty="0" smtClean="0"/>
+              <a:t>             </a:t>
+            </a:r>
+            <a:r>
+              <a:rPr lang="en-US" sz="2300" b="1" dirty="0" smtClean="0"/>
+              <a:t>3: </a:t>
+            </a:r>
+            <a:r>
+              <a:rPr lang="en-US" sz="2300" dirty="0" smtClean="0"/>
+              <a:t>[252.4709480122324</a:t>
+            </a:r>
+            <a:r>
+              <a:rPr lang="en-US" sz="2300" dirty="0"/>
+              <a:t>, 252.70489296636086, 243.44724770642202, 2.868405350395589, 3.2287991970079113, 23.802374410824587], </a:t>
+            </a:r>
+            <a:r>
+              <a:rPr lang="en-US" sz="2300" dirty="0" smtClean="0"/>
+              <a:t>            </a:t>
+            </a:r>
+            <a:r>
+              <a:rPr lang="en-US" sz="2300" b="1" dirty="0" smtClean="0"/>
+              <a:t>4: </a:t>
+            </a:r>
+            <a:r>
+              <a:rPr lang="en-US" sz="2300" dirty="0" smtClean="0"/>
+              <a:t>[63.75916230366492</a:t>
+            </a:r>
+            <a:r>
+              <a:rPr lang="en-US" sz="2300" dirty="0"/>
+              <a:t>, 25.59738219895288, 4.737696335078534, 35.24376752046357, 18.071460634995603, 5.451047541570147</a:t>
+            </a:r>
+            <a:r>
+              <a:rPr lang="en-US" sz="2300" dirty="0" smtClean="0"/>
+              <a:t>]…</a:t>
+            </a:r>
+            <a:endParaRPr lang="en-US" sz="2300" dirty="0"/>
+          </a:p>
+        </p:txBody>
+      </p:sp>
+    </p:spTree>
+    <p:extLst>
+      <p:ext uri="{BB962C8B-B14F-4D97-AF65-F5344CB8AC3E}">
+        <p14:creationId xmlns:p14="http://schemas.microsoft.com/office/powerpoint/2010/main" val="3643063362"/>
+      </p:ext>
+    </p:extLst>
+  </p:cSld>
+  <p:clrMapOvr>
+    <a:masterClrMapping/>
+  </p:clrMapOvr>
+</p:sld>
+</file>
+
+<file path=ppt/slides/slide13.xml><?xml version="1.0" encoding="utf-8"?>
+<p:sld xmlns:a="http://schemas.openxmlformats.org/drawingml/2006/main" xmlns:r="http://schemas.openxmlformats.org/officeDocument/2006/relationships" xmlns:p="http://schemas.openxmlformats.org/presentationml/2006/main">
+  <p:cSld>
+    <p:spTree>
+      <p:nvGrpSpPr>
+        <p:cNvPr id="1" name=""/>
+        <p:cNvGrpSpPr/>
+        <p:nvPr/>
+      </p:nvGrpSpPr>
+      <p:grpSpPr>
+        <a:xfrm>
+          <a:off x="0" y="0"/>
+          <a:ext cx="0" cy="0"/>
+          <a:chOff x="0" y="0"/>
+          <a:chExt cx="0" cy="0"/>
+        </a:xfrm>
+      </p:grpSpPr>
+      <p:sp>
+        <p:nvSpPr>
+          <p:cNvPr id="2" name="Title 1"/>
+          <p:cNvSpPr>
+            <a:spLocks noGrp="1"/>
+          </p:cNvSpPr>
+          <p:nvPr>
+            <p:ph type="title"/>
+          </p:nvPr>
+        </p:nvSpPr>
+        <p:spPr/>
+        <p:txBody>
+          <a:bodyPr>
+            <a:normAutofit fontScale="90000"/>
+          </a:bodyPr>
+          <a:lstStyle/>
+          <a:p>
+            <a:r>
+              <a:rPr lang="en-US" dirty="0"/>
+              <a:t>Machine Learning – Supervised Learning Using SVM</a:t>
+            </a:r>
+          </a:p>
+        </p:txBody>
+      </p:sp>
+      <p:sp>
+        <p:nvSpPr>
+          <p:cNvPr id="3" name="Content Placeholder 2"/>
+          <p:cNvSpPr>
+            <a:spLocks noGrp="1"/>
+          </p:cNvSpPr>
+          <p:nvPr>
+            <p:ph idx="1"/>
+          </p:nvPr>
+        </p:nvSpPr>
+        <p:spPr>
+          <a:xfrm>
+            <a:off x="822959" y="1845734"/>
+            <a:ext cx="7543801" cy="4478866"/>
+          </a:xfrm>
+        </p:spPr>
+        <p:txBody>
+          <a:bodyPr>
+            <a:normAutofit/>
+          </a:bodyPr>
+          <a:lstStyle/>
+          <a:p>
+            <a:pPr marL="0" indent="0">
+              <a:buNone/>
+            </a:pPr>
+            <a:r>
+              <a:rPr lang="en-US" sz="2500" dirty="0" smtClean="0"/>
+              <a:t>Background and key terms involved:</a:t>
+            </a:r>
+          </a:p>
+          <a:p>
+            <a:pPr>
+              <a:buFont typeface="Wingdings" panose="05000000000000000000" pitchFamily="2" charset="2"/>
+              <a:buChar char="v"/>
+            </a:pPr>
+            <a:r>
+              <a:rPr lang="en-US" sz="2400" dirty="0" smtClean="0"/>
+              <a:t> We used Support </a:t>
+            </a:r>
+            <a:r>
+              <a:rPr lang="en-US" sz="2400" dirty="0"/>
+              <a:t>Vector </a:t>
+            </a:r>
+            <a:r>
+              <a:rPr lang="en-US" sz="2400" dirty="0" smtClean="0"/>
+              <a:t>Machines (SVMs)</a:t>
+            </a:r>
+            <a:endParaRPr lang="en-US" sz="2400" dirty="0"/>
+          </a:p>
+          <a:p>
+            <a:pPr>
+              <a:buFont typeface="Wingdings" panose="05000000000000000000" pitchFamily="2" charset="2"/>
+              <a:buChar char="v"/>
+            </a:pPr>
+            <a:r>
+              <a:rPr lang="en-US" sz="2400" dirty="0" smtClean="0"/>
+              <a:t> It is a powerful machine learning technique used for classification</a:t>
+            </a:r>
+          </a:p>
+          <a:p>
+            <a:pPr>
+              <a:buFont typeface="Wingdings" panose="05000000000000000000" pitchFamily="2" charset="2"/>
+              <a:buChar char="v"/>
+            </a:pPr>
+            <a:r>
+              <a:rPr lang="en-US" sz="2400" dirty="0" smtClean="0"/>
+              <a:t> Makes use of feature vectors</a:t>
+            </a:r>
+          </a:p>
+          <a:p>
+            <a:pPr>
+              <a:buFont typeface="Wingdings" panose="05000000000000000000" pitchFamily="2" charset="2"/>
+              <a:buChar char="v"/>
+            </a:pPr>
+            <a:r>
+              <a:rPr lang="en-US" sz="2400" dirty="0" smtClean="0"/>
+              <a:t> These </a:t>
+            </a:r>
+            <a:r>
+              <a:rPr lang="en-US" sz="2400" dirty="0" smtClean="0"/>
+              <a:t>feature vectors describe the categories of classification. For e.g. the tag “sky” will have a feature vector associated with it, which will numerically represent it</a:t>
+            </a:r>
+          </a:p>
+          <a:p>
+            <a:endParaRPr lang="en-US" dirty="0"/>
+          </a:p>
+        </p:txBody>
+      </p:sp>
+    </p:spTree>
+    <p:extLst>
+      <p:ext uri="{BB962C8B-B14F-4D97-AF65-F5344CB8AC3E}">
+        <p14:creationId xmlns:p14="http://schemas.microsoft.com/office/powerpoint/2010/main" val="225259459"/>
+      </p:ext>
+    </p:extLst>
+  </p:cSld>
+  <p:clrMapOvr>
+    <a:masterClrMapping/>
+  </p:clrMapOvr>
+</p:sld>
+</file>
+
+<file path=ppt/slides/slide14.xml><?xml version="1.0" encoding="utf-8"?>
+<p:sld xmlns:a="http://schemas.openxmlformats.org/drawingml/2006/main" xmlns:r="http://schemas.openxmlformats.org/officeDocument/2006/relationships" xmlns:p="http://schemas.openxmlformats.org/presentationml/2006/main">
+  <p:cSld>
+    <p:spTree>
+      <p:nvGrpSpPr>
+        <p:cNvPr id="1" name=""/>
+        <p:cNvGrpSpPr/>
+        <p:nvPr/>
+      </p:nvGrpSpPr>
+      <p:grpSpPr>
+        <a:xfrm>
+          <a:off x="0" y="0"/>
+          <a:ext cx="0" cy="0"/>
+          <a:chOff x="0" y="0"/>
+          <a:chExt cx="0" cy="0"/>
+        </a:xfrm>
+      </p:grpSpPr>
+      <p:sp>
+        <p:nvSpPr>
+          <p:cNvPr id="2" name="Title 1"/>
+          <p:cNvSpPr>
+            <a:spLocks noGrp="1"/>
+          </p:cNvSpPr>
+          <p:nvPr>
+            <p:ph type="title"/>
+          </p:nvPr>
+        </p:nvSpPr>
+        <p:spPr/>
+        <p:txBody>
+          <a:bodyPr>
+            <a:normAutofit/>
+          </a:bodyPr>
+          <a:lstStyle/>
+          <a:p>
+            <a:r>
+              <a:rPr lang="en-US" dirty="0" smtClean="0"/>
+              <a:t>How Support Vector Machines Work</a:t>
+            </a:r>
+            <a:endParaRPr lang="en-US" dirty="0"/>
+          </a:p>
+        </p:txBody>
+      </p:sp>
+      <p:sp>
+        <p:nvSpPr>
+          <p:cNvPr id="3" name="Content Placeholder 2"/>
+          <p:cNvSpPr>
+            <a:spLocks noGrp="1"/>
+          </p:cNvSpPr>
+          <p:nvPr>
+            <p:ph idx="1"/>
+          </p:nvPr>
+        </p:nvSpPr>
+        <p:spPr/>
+        <p:txBody>
+          <a:bodyPr/>
+          <a:lstStyle/>
+          <a:p>
+            <a:pPr marL="201168" lvl="1" indent="0">
+              <a:buNone/>
+            </a:pPr>
+            <a:r>
+              <a:rPr lang="en-US" dirty="0" smtClean="0"/>
+              <a:t>Consider the figure on the right. It represents</a:t>
+            </a:r>
+          </a:p>
+          <a:p>
+            <a:pPr marL="201168" lvl="1" indent="0">
+              <a:buNone/>
+            </a:pPr>
+            <a:r>
+              <a:rPr lang="en-US" dirty="0" smtClean="0"/>
+              <a:t>A set of 2-D feature vectors represented as a plot.</a:t>
+            </a:r>
+          </a:p>
+          <a:p>
+            <a:pPr marL="201168" lvl="1" indent="0">
+              <a:buNone/>
+            </a:pPr>
+            <a:r>
+              <a:rPr lang="en-US" dirty="0" smtClean="0"/>
+              <a:t>In this case, </a:t>
+            </a:r>
+            <a:r>
+              <a:rPr lang="en-US" dirty="0"/>
+              <a:t>the SVM tries to find</a:t>
+            </a:r>
+          </a:p>
+          <a:p>
+            <a:pPr marL="201168" lvl="1" indent="0">
+              <a:buNone/>
+            </a:pPr>
+            <a:r>
+              <a:rPr lang="en-US" dirty="0"/>
+              <a:t>a distinguishing line between </a:t>
+            </a:r>
+            <a:r>
+              <a:rPr lang="en-US" dirty="0" smtClean="0"/>
+              <a:t>the 2 types of</a:t>
+            </a:r>
+          </a:p>
+          <a:p>
+            <a:pPr marL="201168" lvl="1" indent="0">
+              <a:buNone/>
+            </a:pPr>
+            <a:r>
+              <a:rPr lang="en-US" dirty="0" smtClean="0"/>
+              <a:t>objects to be classified. This line is called a</a:t>
+            </a:r>
+          </a:p>
+          <a:p>
+            <a:pPr marL="201168" lvl="1" indent="0">
+              <a:buNone/>
+            </a:pPr>
+            <a:r>
+              <a:rPr lang="en-US" dirty="0" smtClean="0"/>
+              <a:t>hyperplane.</a:t>
+            </a:r>
+          </a:p>
+          <a:p>
+            <a:pPr marL="201168" lvl="1" indent="0">
+              <a:buNone/>
+            </a:pPr>
+            <a:r>
+              <a:rPr lang="en-US" dirty="0" smtClean="0"/>
+              <a:t>Similarly, for </a:t>
+            </a:r>
+            <a:r>
+              <a:rPr lang="en-US" dirty="0"/>
+              <a:t>N dimension feature </a:t>
+            </a:r>
+            <a:r>
+              <a:rPr lang="en-US" dirty="0" smtClean="0"/>
+              <a:t>vectors,</a:t>
+            </a:r>
+          </a:p>
+          <a:p>
+            <a:pPr marL="201168" lvl="1" indent="0">
+              <a:buNone/>
+            </a:pPr>
+            <a:r>
+              <a:rPr lang="en-US" dirty="0" smtClean="0"/>
+              <a:t>the equivalent of </a:t>
+            </a:r>
+            <a:r>
+              <a:rPr lang="en-US" dirty="0"/>
+              <a:t>this “line” is an N-1 </a:t>
+            </a:r>
+            <a:r>
+              <a:rPr lang="en-US" dirty="0" smtClean="0"/>
+              <a:t>dimension</a:t>
+            </a:r>
+          </a:p>
+          <a:p>
+            <a:pPr marL="201168" lvl="1" indent="0">
+              <a:buNone/>
+            </a:pPr>
+            <a:r>
+              <a:rPr lang="en-US" dirty="0" smtClean="0"/>
+              <a:t>hyperplane which separates </a:t>
+            </a:r>
+            <a:r>
+              <a:rPr lang="en-US" dirty="0"/>
+              <a:t>the data </a:t>
+            </a:r>
+            <a:r>
+              <a:rPr lang="en-US" dirty="0" smtClean="0"/>
+              <a:t>points. So </a:t>
+            </a:r>
+            <a:r>
+              <a:rPr lang="en-US" dirty="0"/>
+              <a:t>based on which side</a:t>
+            </a:r>
+          </a:p>
+          <a:p>
+            <a:pPr marL="201168" lvl="1" indent="0">
+              <a:buNone/>
+            </a:pPr>
+            <a:r>
+              <a:rPr lang="en-US" dirty="0"/>
+              <a:t>of the hyperplane the new data lies on, the SVM</a:t>
+            </a:r>
+          </a:p>
+          <a:p>
+            <a:pPr marL="201168" lvl="1" indent="0">
+              <a:buNone/>
+            </a:pPr>
+            <a:r>
+              <a:rPr lang="en-US" dirty="0"/>
+              <a:t>predicts which class/category it belongs to.</a:t>
+            </a:r>
+          </a:p>
+        </p:txBody>
+      </p:sp>
+      <p:pic>
+        <p:nvPicPr>
+          <p:cNvPr id="4" name="Picture 3"/>
+          <p:cNvPicPr>
+            <a:picLocks noChangeAspect="1"/>
+          </p:cNvPicPr>
+          <p:nvPr/>
+        </p:nvPicPr>
+        <p:blipFill>
+          <a:blip r:embed="rId3" cstate="print">
+            <a:extLst>
+              <a:ext uri="{28A0092B-C50C-407E-A947-70E740481C1C}">
+                <a14:useLocalDpi xmlns:a14="http://schemas.microsoft.com/office/drawing/2010/main" val="0"/>
+              </a:ext>
+            </a:extLst>
+          </a:blip>
+          <a:stretch>
+            <a:fillRect/>
+          </a:stretch>
+        </p:blipFill>
+        <p:spPr>
+          <a:xfrm>
+            <a:off x="5632890" y="1845734"/>
+            <a:ext cx="2733870" cy="2679193"/>
+          </a:xfrm>
+          <a:prstGeom prst="rect">
+            <a:avLst/>
+          </a:prstGeom>
+        </p:spPr>
+      </p:pic>
+      <p:sp>
+        <p:nvSpPr>
+          <p:cNvPr id="5" name="Footer Placeholder 4"/>
+          <p:cNvSpPr>
+            <a:spLocks noGrp="1"/>
+          </p:cNvSpPr>
+          <p:nvPr>
+            <p:ph type="ftr" sz="quarter" idx="11"/>
+          </p:nvPr>
+        </p:nvSpPr>
+        <p:spPr>
+          <a:xfrm>
+            <a:off x="-17318" y="6375933"/>
+            <a:ext cx="7408718" cy="365125"/>
+          </a:xfrm>
+        </p:spPr>
+        <p:txBody>
+          <a:bodyPr/>
+          <a:lstStyle/>
+          <a:p>
+            <a:pPr algn="l"/>
+            <a:r>
+              <a:rPr lang="en-US" dirty="0" smtClean="0"/>
+              <a:t>Picture taken from Http://</a:t>
+            </a:r>
+            <a:r>
+              <a:rPr lang="en-US" sz="1000" dirty="0" smtClean="0"/>
+              <a:t>docs.opencv.org/2.4/doc/tutorials/ml/introduction_to_svm/introduction_to_svm.html</a:t>
+            </a:r>
+            <a:endParaRPr lang="en-US" dirty="0"/>
+          </a:p>
+        </p:txBody>
+      </p:sp>
+    </p:spTree>
+    <p:extLst>
+      <p:ext uri="{BB962C8B-B14F-4D97-AF65-F5344CB8AC3E}">
+        <p14:creationId xmlns:p14="http://schemas.microsoft.com/office/powerpoint/2010/main" val="3962105909"/>
+      </p:ext>
+    </p:extLst>
+  </p:cSld>
+  <p:clrMapOvr>
+    <a:masterClrMapping/>
+  </p:clrMapOvr>
+</p:sld>
+</file>
+
+<file path=ppt/slides/slide15.xml><?xml version="1.0" encoding="utf-8"?>
+<p:sld xmlns:a="http://schemas.openxmlformats.org/drawingml/2006/main" xmlns:r="http://schemas.openxmlformats.org/officeDocument/2006/relationships" xmlns:p="http://schemas.openxmlformats.org/presentationml/2006/main">
+  <p:cSld>
+    <p:spTree>
+      <p:nvGrpSpPr>
+        <p:cNvPr id="1" name=""/>
+        <p:cNvGrpSpPr/>
+        <p:nvPr/>
+      </p:nvGrpSpPr>
+      <p:grpSpPr>
+        <a:xfrm>
+          <a:off x="0" y="0"/>
+          <a:ext cx="0" cy="0"/>
+          <a:chOff x="0" y="0"/>
+          <a:chExt cx="0" cy="0"/>
+        </a:xfrm>
+      </p:grpSpPr>
+      <p:sp>
+        <p:nvSpPr>
+          <p:cNvPr id="2" name="Title 1"/>
+          <p:cNvSpPr>
+            <a:spLocks noGrp="1"/>
+          </p:cNvSpPr>
+          <p:nvPr>
+            <p:ph type="title"/>
+          </p:nvPr>
+        </p:nvSpPr>
+        <p:spPr>
+          <a:xfrm>
+            <a:off x="822960" y="762000"/>
+            <a:ext cx="7543800" cy="975361"/>
+          </a:xfrm>
+        </p:spPr>
+        <p:txBody>
+          <a:bodyPr>
+            <a:normAutofit fontScale="90000"/>
+          </a:bodyPr>
+          <a:lstStyle/>
+          <a:p>
+            <a:r>
+              <a:rPr lang="en-US" dirty="0" smtClean="0"/>
+              <a:t>Overall Process of Machine Learning</a:t>
+            </a:r>
+            <a:endParaRPr lang="en-US" dirty="0"/>
+          </a:p>
+        </p:txBody>
+      </p:sp>
+      <p:sp>
+        <p:nvSpPr>
+          <p:cNvPr id="3" name="Content Placeholder 2"/>
+          <p:cNvSpPr>
+            <a:spLocks noGrp="1"/>
+          </p:cNvSpPr>
+          <p:nvPr>
+            <p:ph idx="1"/>
+          </p:nvPr>
+        </p:nvSpPr>
+        <p:spPr>
+          <a:xfrm>
+            <a:off x="822959" y="1845734"/>
+            <a:ext cx="7543801" cy="4402666"/>
+          </a:xfrm>
+        </p:spPr>
+        <p:txBody>
+          <a:bodyPr>
+            <a:noAutofit/>
+          </a:bodyPr>
+          <a:lstStyle/>
+          <a:p>
+            <a:pPr marL="251460" indent="-342900">
+              <a:buFont typeface="Wingdings" panose="05000000000000000000" pitchFamily="2" charset="2"/>
+              <a:buChar char="v"/>
+            </a:pPr>
+            <a:r>
+              <a:rPr lang="en-US" dirty="0" smtClean="0"/>
+              <a:t>This type of classification is based on feature vectors generated by processing  the segments in each image</a:t>
+            </a:r>
+          </a:p>
+          <a:p>
+            <a:pPr marL="251460" indent="-342900">
+              <a:buFont typeface="Wingdings" panose="05000000000000000000" pitchFamily="2" charset="2"/>
+              <a:buChar char="v"/>
+            </a:pPr>
+            <a:r>
+              <a:rPr lang="en-US" dirty="0" smtClean="0"/>
+              <a:t>The feature vector we used is a 6-D vector of numerical values representing a segment of an image</a:t>
+            </a:r>
+          </a:p>
+          <a:p>
+            <a:pPr marL="251460" indent="-342900">
+              <a:buFont typeface="Wingdings" panose="05000000000000000000" pitchFamily="2" charset="2"/>
+              <a:buChar char="v"/>
+            </a:pPr>
+            <a:r>
+              <a:rPr lang="en-US" dirty="0" smtClean="0"/>
+              <a:t>Each vector is associated with an image tag, e.g. “sky”</a:t>
+            </a:r>
+          </a:p>
+          <a:p>
+            <a:pPr marL="251460" indent="-342900">
+              <a:buFont typeface="Wingdings" panose="05000000000000000000" pitchFamily="2" charset="2"/>
+              <a:buChar char="v"/>
+            </a:pPr>
+            <a:r>
+              <a:rPr lang="en-US" dirty="0" smtClean="0"/>
+              <a:t>Using the feature vectors along with the labels for each tag, a machine learning model was created (this is where the hyperplane comes into the picture)</a:t>
+            </a:r>
+          </a:p>
+          <a:p>
+            <a:pPr marL="251460" indent="-342900">
+              <a:buFont typeface="Wingdings" panose="05000000000000000000" pitchFamily="2" charset="2"/>
+              <a:buChar char="v"/>
+            </a:pPr>
+            <a:r>
+              <a:rPr lang="en-US" dirty="0" smtClean="0"/>
+              <a:t>This model was then used to predict what things the new image contains</a:t>
+            </a:r>
+          </a:p>
+          <a:p>
+            <a:pPr marL="251460" indent="-342900">
+              <a:buFont typeface="Wingdings" panose="05000000000000000000" pitchFamily="2" charset="2"/>
+              <a:buChar char="v"/>
+            </a:pPr>
+            <a:r>
+              <a:rPr lang="en-US" dirty="0" smtClean="0"/>
+              <a:t>The SVM provided tags and probabilities associated with each tag</a:t>
+            </a:r>
+          </a:p>
+          <a:p>
+            <a:pPr marL="251460" indent="-342900">
+              <a:buFont typeface="Wingdings" panose="05000000000000000000" pitchFamily="2" charset="2"/>
+              <a:buChar char="v"/>
+            </a:pPr>
+            <a:r>
+              <a:rPr lang="en-US" dirty="0" smtClean="0"/>
+              <a:t>We used the SVM library provided by </a:t>
+            </a:r>
+            <a:r>
+              <a:rPr lang="en-US" dirty="0" err="1" smtClean="0"/>
+              <a:t>scikit</a:t>
+            </a:r>
+            <a:r>
+              <a:rPr lang="en-US" dirty="0" smtClean="0"/>
+              <a:t>-learn</a:t>
+            </a:r>
+          </a:p>
+        </p:txBody>
+      </p:sp>
+    </p:spTree>
+    <p:extLst>
+      <p:ext uri="{BB962C8B-B14F-4D97-AF65-F5344CB8AC3E}">
+        <p14:creationId xmlns:p14="http://schemas.microsoft.com/office/powerpoint/2010/main" val="3160203011"/>
+      </p:ext>
+    </p:extLst>
+  </p:cSld>
+  <p:clrMapOvr>
+    <a:masterClrMapping/>
+  </p:clrMapOvr>
+</p:sld>
+</file>
+
+<file path=ppt/slides/slide16.xml><?xml version="1.0" encoding="utf-8"?>
+<p:sld xmlns:a="http://schemas.openxmlformats.org/drawingml/2006/main" xmlns:r="http://schemas.openxmlformats.org/officeDocument/2006/relationships" xmlns:p="http://schemas.openxmlformats.org/presentationml/2006/main">
+  <p:cSld>
+    <p:spTree>
+      <p:nvGrpSpPr>
+        <p:cNvPr id="1" name=""/>
+        <p:cNvGrpSpPr/>
+        <p:nvPr/>
+      </p:nvGrpSpPr>
+      <p:grpSpPr>
+        <a:xfrm>
+          <a:off x="0" y="0"/>
+          <a:ext cx="0" cy="0"/>
+          <a:chOff x="0" y="0"/>
+          <a:chExt cx="0" cy="0"/>
+        </a:xfrm>
+      </p:grpSpPr>
+      <p:sp>
+        <p:nvSpPr>
+          <p:cNvPr id="2" name="Title 1"/>
+          <p:cNvSpPr>
+            <a:spLocks noGrp="1"/>
+          </p:cNvSpPr>
+          <p:nvPr>
+            <p:ph type="title"/>
+          </p:nvPr>
+        </p:nvSpPr>
+        <p:spPr/>
+        <p:txBody>
+          <a:bodyPr/>
+          <a:lstStyle/>
+          <a:p>
+            <a:r>
+              <a:rPr lang="en-US" dirty="0" smtClean="0"/>
+              <a:t>Results</a:t>
+            </a:r>
+            <a:endParaRPr lang="en-US" dirty="0"/>
+          </a:p>
+        </p:txBody>
+      </p:sp>
+      <p:sp>
+        <p:nvSpPr>
+          <p:cNvPr id="3" name="Content Placeholder 2"/>
+          <p:cNvSpPr>
+            <a:spLocks noGrp="1"/>
+          </p:cNvSpPr>
+          <p:nvPr>
+            <p:ph idx="1"/>
+          </p:nvPr>
+        </p:nvSpPr>
+        <p:spPr/>
+        <p:txBody>
+          <a:bodyPr/>
+          <a:lstStyle/>
+          <a:p>
+            <a:r>
+              <a:rPr lang="en-US" dirty="0" smtClean="0"/>
+              <a:t>The image on the right shows the top</a:t>
+            </a:r>
+          </a:p>
+          <a:p>
+            <a:r>
+              <a:rPr lang="en-US" dirty="0"/>
+              <a:t>3</a:t>
+            </a:r>
+            <a:r>
+              <a:rPr lang="en-US" dirty="0" smtClean="0"/>
+              <a:t> tags generated by the classifier. It</a:t>
+            </a:r>
+          </a:p>
+          <a:p>
+            <a:r>
+              <a:rPr lang="en-US" dirty="0" smtClean="0"/>
+              <a:t>detected ‘sky’ with a probability of</a:t>
+            </a:r>
+          </a:p>
+          <a:p>
+            <a:r>
+              <a:rPr lang="en-US" dirty="0" smtClean="0"/>
+              <a:t>70.9%, ‘trees’ with a probability of</a:t>
+            </a:r>
+          </a:p>
+          <a:p>
+            <a:r>
+              <a:rPr lang="en-US" dirty="0" smtClean="0"/>
+              <a:t>41.7%, and ‘water’ with a probability</a:t>
+            </a:r>
+          </a:p>
+          <a:p>
+            <a:r>
+              <a:rPr lang="en-US" dirty="0"/>
+              <a:t>o</a:t>
+            </a:r>
+            <a:r>
+              <a:rPr lang="en-US" dirty="0" smtClean="0"/>
+              <a:t>f 22.8%. The classifier predicted the</a:t>
+            </a:r>
+          </a:p>
+          <a:p>
+            <a:r>
+              <a:rPr lang="en-US" dirty="0" smtClean="0"/>
+              <a:t>main segments of the image</a:t>
+            </a:r>
+          </a:p>
+          <a:p>
+            <a:r>
+              <a:rPr lang="en-US" dirty="0" smtClean="0"/>
+              <a:t>successfully.</a:t>
+            </a:r>
+          </a:p>
+        </p:txBody>
+      </p:sp>
+      <p:pic>
+        <p:nvPicPr>
+          <p:cNvPr id="8" name="Picture 7"/>
+          <p:cNvPicPr>
+            <a:picLocks noChangeAspect="1"/>
+          </p:cNvPicPr>
+          <p:nvPr/>
+        </p:nvPicPr>
+        <p:blipFill>
+          <a:blip r:embed="rId2">
+            <a:extLst>
+              <a:ext uri="{28A0092B-C50C-407E-A947-70E740481C1C}">
+                <a14:useLocalDpi xmlns:a14="http://schemas.microsoft.com/office/drawing/2010/main" val="0"/>
+              </a:ext>
+            </a:extLst>
+          </a:blip>
+          <a:stretch>
+            <a:fillRect/>
+          </a:stretch>
+        </p:blipFill>
+        <p:spPr>
+          <a:xfrm>
+            <a:off x="4867080" y="1845734"/>
+            <a:ext cx="3499679" cy="3107266"/>
+          </a:xfrm>
+          <a:prstGeom prst="rect">
+            <a:avLst/>
+          </a:prstGeom>
+        </p:spPr>
+      </p:pic>
+    </p:spTree>
+    <p:extLst>
+      <p:ext uri="{BB962C8B-B14F-4D97-AF65-F5344CB8AC3E}">
+        <p14:creationId xmlns:p14="http://schemas.microsoft.com/office/powerpoint/2010/main" val="185477106"/>
+      </p:ext>
+    </p:extLst>
+  </p:cSld>
+  <p:clrMapOvr>
+    <a:masterClrMapping/>
+  </p:clrMapOvr>
+</p:sld>
+</file>
+
+<file path=ppt/slides/slide17.xml><?xml version="1.0" encoding="utf-8"?>
+<p:sld xmlns:a="http://schemas.openxmlformats.org/drawingml/2006/main" xmlns:r="http://schemas.openxmlformats.org/officeDocument/2006/relationships" xmlns:p="http://schemas.openxmlformats.org/presentationml/2006/main">
+  <p:cSld>
+    <p:spTree>
+      <p:nvGrpSpPr>
+        <p:cNvPr id="1" name=""/>
+        <p:cNvGrpSpPr/>
+        <p:nvPr/>
+      </p:nvGrpSpPr>
+      <p:grpSpPr>
+        <a:xfrm>
+          <a:off x="0" y="0"/>
+          <a:ext cx="0" cy="0"/>
+          <a:chOff x="0" y="0"/>
+          <a:chExt cx="0" cy="0"/>
+        </a:xfrm>
+      </p:grpSpPr>
+      <p:sp>
+        <p:nvSpPr>
+          <p:cNvPr id="2" name="Title 1"/>
+          <p:cNvSpPr>
+            <a:spLocks noGrp="1"/>
+          </p:cNvSpPr>
+          <p:nvPr>
+            <p:ph type="title"/>
+          </p:nvPr>
+        </p:nvSpPr>
+        <p:spPr/>
+        <p:txBody>
+          <a:bodyPr/>
+          <a:lstStyle/>
+          <a:p>
+            <a:r>
+              <a:rPr lang="en-US" dirty="0" smtClean="0"/>
+              <a:t>Limitations of the Classifier</a:t>
+            </a:r>
+            <a:endParaRPr lang="en-US" dirty="0"/>
+          </a:p>
+        </p:txBody>
+      </p:sp>
+      <p:sp>
+        <p:nvSpPr>
+          <p:cNvPr id="3" name="Content Placeholder 2"/>
+          <p:cNvSpPr>
+            <a:spLocks noGrp="1"/>
+          </p:cNvSpPr>
+          <p:nvPr>
+            <p:ph idx="1"/>
+          </p:nvPr>
+        </p:nvSpPr>
+        <p:spPr/>
+        <p:txBody>
+          <a:bodyPr>
+            <a:normAutofit/>
+          </a:bodyPr>
+          <a:lstStyle/>
+          <a:p>
+            <a:pPr>
+              <a:buFont typeface="Wingdings" panose="05000000000000000000" pitchFamily="2" charset="2"/>
+              <a:buChar char="v"/>
+            </a:pPr>
+            <a:r>
+              <a:rPr lang="en-US" sz="2400" dirty="0" smtClean="0"/>
+              <a:t> </a:t>
+            </a:r>
+            <a:r>
+              <a:rPr lang="en-US" sz="2400" dirty="0" smtClean="0"/>
+              <a:t>Very limited </a:t>
+            </a:r>
+            <a:r>
+              <a:rPr lang="en-US" sz="2400" dirty="0" smtClean="0"/>
+              <a:t>in what kinds of things it can detect. Most of our training data consisted of outdoor images, so the classifier detects sky, water, grass, trees, etc. better than other </a:t>
+            </a:r>
+            <a:r>
+              <a:rPr lang="en-US" sz="2400" dirty="0" smtClean="0"/>
+              <a:t>things</a:t>
+            </a:r>
+            <a:endParaRPr lang="en-US" sz="2400" dirty="0" smtClean="0"/>
+          </a:p>
+          <a:p>
+            <a:pPr>
+              <a:buFont typeface="Wingdings" panose="05000000000000000000" pitchFamily="2" charset="2"/>
+              <a:buChar char="v"/>
+            </a:pPr>
+            <a:r>
+              <a:rPr lang="en-US" sz="2400" dirty="0" smtClean="0"/>
+              <a:t> Since the training set was very small, the classification is very limited, and the accuracy is not very high </a:t>
+            </a:r>
+            <a:r>
+              <a:rPr lang="en-US" sz="2400" dirty="0" smtClean="0"/>
+              <a:t>either</a:t>
+            </a:r>
+            <a:endParaRPr lang="en-US" sz="2400" dirty="0" smtClean="0"/>
+          </a:p>
+          <a:p>
+            <a:pPr>
+              <a:buFont typeface="Wingdings" panose="05000000000000000000" pitchFamily="2" charset="2"/>
+              <a:buChar char="v"/>
+            </a:pPr>
+            <a:r>
+              <a:rPr lang="en-US" sz="2400" dirty="0" smtClean="0"/>
+              <a:t> The classification is color based, and shape is not taken into consideration. This sometimes results in erroneous classification for things that are similar in </a:t>
+            </a:r>
+            <a:r>
+              <a:rPr lang="en-US" sz="2400" dirty="0" smtClean="0"/>
+              <a:t>color</a:t>
+            </a:r>
+            <a:endParaRPr lang="en-US" sz="2400" dirty="0" smtClean="0"/>
+          </a:p>
+        </p:txBody>
+      </p:sp>
+    </p:spTree>
+    <p:extLst>
+      <p:ext uri="{BB962C8B-B14F-4D97-AF65-F5344CB8AC3E}">
+        <p14:creationId xmlns:p14="http://schemas.microsoft.com/office/powerpoint/2010/main" val="3692240385"/>
+      </p:ext>
+    </p:extLst>
+  </p:cSld>
+  <p:clrMapOvr>
+    <a:masterClrMapping/>
+  </p:clrMapOvr>
+</p:sld>
+</file>
+
+<file path=ppt/slides/slide18.xml><?xml version="1.0" encoding="utf-8"?>
+<p:sld xmlns:a="http://schemas.openxmlformats.org/drawingml/2006/main" xmlns:r="http://schemas.openxmlformats.org/officeDocument/2006/relationships" xmlns:p="http://schemas.openxmlformats.org/presentationml/2006/main">
+  <p:cSld>
+    <p:spTree>
+      <p:nvGrpSpPr>
+        <p:cNvPr id="1" name=""/>
+        <p:cNvGrpSpPr/>
+        <p:nvPr/>
+      </p:nvGrpSpPr>
+      <p:grpSpPr>
+        <a:xfrm>
+          <a:off x="0" y="0"/>
+          <a:ext cx="0" cy="0"/>
+          <a:chOff x="0" y="0"/>
+          <a:chExt cx="0" cy="0"/>
+        </a:xfrm>
+      </p:grpSpPr>
+      <p:sp>
+        <p:nvSpPr>
+          <p:cNvPr id="2" name="Title 1"/>
+          <p:cNvSpPr>
+            <a:spLocks noGrp="1"/>
+          </p:cNvSpPr>
+          <p:nvPr>
+            <p:ph type="title"/>
+          </p:nvPr>
+        </p:nvSpPr>
+        <p:spPr/>
+        <p:txBody>
+          <a:bodyPr/>
+          <a:lstStyle/>
+          <a:p>
+            <a:r>
+              <a:rPr lang="en-US" dirty="0" smtClean="0"/>
+              <a:t>Conclusion and Future Work</a:t>
+            </a:r>
+            <a:endParaRPr lang="en-US" dirty="0"/>
+          </a:p>
+        </p:txBody>
+      </p:sp>
+      <p:sp>
+        <p:nvSpPr>
+          <p:cNvPr id="3" name="Content Placeholder 2"/>
+          <p:cNvSpPr>
+            <a:spLocks noGrp="1"/>
+          </p:cNvSpPr>
+          <p:nvPr>
+            <p:ph idx="1"/>
+          </p:nvPr>
+        </p:nvSpPr>
+        <p:spPr/>
+        <p:txBody>
+          <a:bodyPr>
+            <a:normAutofit/>
+          </a:bodyPr>
+          <a:lstStyle/>
+          <a:p>
+            <a:pPr>
+              <a:buFont typeface="Wingdings" panose="05000000000000000000" pitchFamily="2" charset="2"/>
+              <a:buChar char="v"/>
+            </a:pPr>
+            <a:r>
+              <a:rPr lang="en-US" sz="2400" dirty="0" smtClean="0"/>
+              <a:t> Biggest conclusion – image classification is very difficult</a:t>
+            </a:r>
+          </a:p>
+          <a:p>
+            <a:pPr>
+              <a:buFont typeface="Wingdings" panose="05000000000000000000" pitchFamily="2" charset="2"/>
+              <a:buChar char="v"/>
+            </a:pPr>
+            <a:r>
+              <a:rPr lang="en-US" sz="2400" dirty="0"/>
+              <a:t> </a:t>
+            </a:r>
+            <a:r>
+              <a:rPr lang="en-US" sz="2400" dirty="0" smtClean="0"/>
+              <a:t>Even with lots of tools available, there is still a lot of work that needs to be done to make a good classifier</a:t>
+            </a:r>
+          </a:p>
+          <a:p>
+            <a:pPr>
+              <a:buFont typeface="Wingdings" panose="05000000000000000000" pitchFamily="2" charset="2"/>
+              <a:buChar char="v"/>
+            </a:pPr>
+            <a:r>
+              <a:rPr lang="en-US" sz="2400" dirty="0" smtClean="0"/>
+              <a:t> Future work – generate better </a:t>
+            </a:r>
+            <a:r>
+              <a:rPr lang="en-US" sz="2400" dirty="0"/>
+              <a:t>feature vectors by </a:t>
+            </a:r>
+            <a:r>
+              <a:rPr lang="en-US" sz="2400" dirty="0" smtClean="0"/>
+              <a:t>investigating </a:t>
+            </a:r>
+            <a:r>
+              <a:rPr lang="en-US" sz="2400" dirty="0"/>
+              <a:t>different factors to form the basis for </a:t>
+            </a:r>
+            <a:r>
+              <a:rPr lang="en-US" sz="2400" dirty="0" smtClean="0"/>
+              <a:t>them</a:t>
+            </a:r>
+          </a:p>
+          <a:p>
+            <a:pPr>
+              <a:buFont typeface="Wingdings" panose="05000000000000000000" pitchFamily="2" charset="2"/>
+              <a:buChar char="v"/>
+            </a:pPr>
+            <a:r>
+              <a:rPr lang="en-US" sz="2400" dirty="0"/>
+              <a:t> </a:t>
+            </a:r>
+            <a:r>
+              <a:rPr lang="en-US" sz="2400" dirty="0" smtClean="0"/>
+              <a:t>This would help in classifying </a:t>
+            </a:r>
+            <a:r>
+              <a:rPr lang="en-US" sz="2400" dirty="0"/>
+              <a:t>images with higher accuracy and </a:t>
+            </a:r>
+            <a:r>
+              <a:rPr lang="en-US" sz="2400" dirty="0" smtClean="0"/>
+              <a:t>drawing </a:t>
+            </a:r>
+            <a:r>
+              <a:rPr lang="en-US" sz="2400" dirty="0"/>
+              <a:t>conclusions about relations between various entities within the </a:t>
+            </a:r>
+            <a:r>
+              <a:rPr lang="en-US" sz="2400" dirty="0" smtClean="0"/>
+              <a:t>images</a:t>
+            </a:r>
+            <a:endParaRPr lang="en-US" sz="2400" dirty="0"/>
+          </a:p>
+        </p:txBody>
+      </p:sp>
+    </p:spTree>
+    <p:extLst>
+      <p:ext uri="{BB962C8B-B14F-4D97-AF65-F5344CB8AC3E}">
+        <p14:creationId xmlns:p14="http://schemas.microsoft.com/office/powerpoint/2010/main" val="799280972"/>
+      </p:ext>
+    </p:extLst>
+  </p:cSld>
+  <p:clrMapOvr>
+    <a:masterClrMapping/>
+  </p:clrMapOvr>
+</p:sld>
+</file>
+
 <file path=ppt/slides/slide2.xml><?xml version="1.0" encoding="utf-8"?>
 <p:sld xmlns:a="http://schemas.openxmlformats.org/drawingml/2006/main" xmlns:r="http://schemas.openxmlformats.org/officeDocument/2006/relationships" xmlns:p="http://schemas.openxmlformats.org/presentationml/2006/main">
   <p:cSld>
@@ -4575,13 +6049,11 @@
           <a:p>
             <a:r>
               <a:rPr lang="en-US" dirty="0" smtClean="0">
-                <a:latin typeface="Times New Roman"/>
                 <a:cs typeface="Times New Roman"/>
               </a:rPr>
               <a:t>Overview</a:t>
             </a:r>
             <a:endParaRPr lang="en-US" dirty="0">
-              <a:latin typeface="Times New Roman"/>
               <a:cs typeface="Times New Roman"/>
             </a:endParaRPr>
           </a:p>
@@ -4605,175 +6077,157 @@
         </p:spPr>
         <p:txBody>
           <a:bodyPr>
-            <a:normAutofit fontScale="92500" lnSpcReduction="20000"/>
+            <a:normAutofit fontScale="70000" lnSpcReduction="20000"/>
           </a:bodyPr>
           <a:lstStyle/>
           <a:p>
             <a:pPr>
               <a:buFont typeface="Wingdings" panose="05000000000000000000" pitchFamily="2" charset="2"/>
-              <a:buChar char="§"/>
+              <a:buChar char="v"/>
             </a:pPr>
             <a:r>
               <a:rPr lang="en-US" sz="2400" dirty="0" smtClean="0">
-                <a:latin typeface="Times New Roman"/>
-                <a:cs typeface="Times New Roman"/>
-              </a:rPr>
-              <a:t>Introduction</a:t>
-            </a:r>
-          </a:p>
-          <a:p>
-            <a:pPr>
-              <a:buFont typeface="Wingdings" panose="05000000000000000000" pitchFamily="2" charset="2"/>
-              <a:buChar char="§"/>
-            </a:pPr>
-            <a:r>
-              <a:rPr lang="en-US" sz="2400" dirty="0" smtClean="0">
-                <a:latin typeface="Times New Roman"/>
-                <a:cs typeface="Times New Roman"/>
-              </a:rPr>
-              <a:t>Data Acquisition and Data Engineering</a:t>
-            </a:r>
-          </a:p>
-          <a:p>
-            <a:pPr>
-              <a:buFont typeface="Wingdings" panose="05000000000000000000" pitchFamily="2" charset="2"/>
-              <a:buChar char="§"/>
-            </a:pPr>
-            <a:r>
-              <a:rPr lang="en-US" sz="2400" dirty="0" smtClean="0">
-                <a:latin typeface="Times New Roman"/>
-                <a:cs typeface="Times New Roman"/>
-              </a:rPr>
-              <a:t> Image Processing</a:t>
-            </a:r>
-          </a:p>
-          <a:p>
-            <a:pPr lvl="1">
-              <a:buFont typeface="Wingdings" panose="05000000000000000000" pitchFamily="2" charset="2"/>
-              <a:buChar char="§"/>
-            </a:pPr>
-            <a:r>
-              <a:rPr lang="en-US" sz="1900" dirty="0" smtClean="0">
-                <a:latin typeface="Times New Roman"/>
-                <a:cs typeface="Times New Roman"/>
-              </a:rPr>
-              <a:t>SLIC</a:t>
-            </a:r>
-          </a:p>
-          <a:p>
-            <a:pPr lvl="1">
-              <a:buFont typeface="Wingdings" panose="05000000000000000000" pitchFamily="2" charset="2"/>
-              <a:buChar char="§"/>
-            </a:pPr>
-            <a:r>
-              <a:rPr lang="en-US" sz="1900" dirty="0" smtClean="0">
-                <a:latin typeface="Times New Roman"/>
-                <a:cs typeface="Times New Roman"/>
-              </a:rPr>
-              <a:t>DBSCAN</a:t>
-            </a:r>
-          </a:p>
-          <a:p>
-            <a:pPr lvl="1">
-              <a:buFont typeface="Wingdings" panose="05000000000000000000" pitchFamily="2" charset="2"/>
-              <a:buChar char="§"/>
-            </a:pPr>
-            <a:r>
-              <a:rPr lang="en-US" sz="1900" dirty="0" smtClean="0">
-                <a:latin typeface="Times New Roman"/>
-                <a:cs typeface="Times New Roman"/>
-              </a:rPr>
-              <a:t>Sobel filtering</a:t>
-            </a:r>
-          </a:p>
-          <a:p>
-            <a:pPr>
-              <a:buFont typeface="Wingdings" panose="05000000000000000000" pitchFamily="2" charset="2"/>
-              <a:buChar char="§"/>
-            </a:pPr>
-            <a:r>
-              <a:rPr lang="en-US" sz="2400" dirty="0" smtClean="0">
-                <a:latin typeface="Times New Roman"/>
-                <a:cs typeface="Times New Roman"/>
-              </a:rPr>
-              <a:t>Machine Learning</a:t>
-            </a:r>
-          </a:p>
-          <a:p>
-            <a:pPr lvl="1">
-              <a:buFont typeface="Wingdings" panose="05000000000000000000" pitchFamily="2" charset="2"/>
-              <a:buChar char="§"/>
-            </a:pPr>
-            <a:r>
-              <a:rPr lang="en-US" sz="1900" dirty="0" smtClean="0">
-                <a:latin typeface="Times New Roman"/>
-                <a:cs typeface="Times New Roman"/>
-              </a:rPr>
-              <a:t>GUI</a:t>
-            </a:r>
-          </a:p>
-          <a:p>
-            <a:pPr lvl="1">
-              <a:buFont typeface="Wingdings" panose="05000000000000000000" pitchFamily="2" charset="2"/>
-              <a:buChar char="§"/>
-            </a:pPr>
-            <a:r>
-              <a:rPr lang="en-US" sz="1900" dirty="0" smtClean="0">
-                <a:latin typeface="Times New Roman"/>
-                <a:cs typeface="Times New Roman"/>
-              </a:rPr>
-              <a:t>Supervised learning using SVM</a:t>
-            </a:r>
-          </a:p>
-          <a:p>
-            <a:pPr>
-              <a:buFont typeface="Wingdings" panose="05000000000000000000" pitchFamily="2" charset="2"/>
-              <a:buChar char="§"/>
-            </a:pPr>
-            <a:r>
-              <a:rPr lang="en-US" dirty="0">
-                <a:latin typeface="Times New Roman"/>
+                <a:latin typeface="+mj-lt"/>
                 <a:cs typeface="Times New Roman"/>
               </a:rPr>
               <a:t> </a:t>
             </a:r>
             <a:r>
+              <a:rPr lang="en-US" sz="2600" dirty="0"/>
+              <a:t>Introduction</a:t>
+            </a:r>
+          </a:p>
+          <a:p>
+            <a:pPr>
+              <a:buFont typeface="Wingdings" panose="05000000000000000000" pitchFamily="2" charset="2"/>
+              <a:buChar char="v"/>
+            </a:pPr>
+            <a:r>
               <a:rPr lang="en-US" sz="2400" dirty="0" smtClean="0">
-                <a:latin typeface="Times New Roman"/>
+                <a:latin typeface="+mj-lt"/>
                 <a:cs typeface="Times New Roman"/>
               </a:rPr>
-              <a:t>Results</a:t>
+              <a:t> </a:t>
+            </a:r>
+            <a:r>
+              <a:rPr lang="en-US" sz="2600" dirty="0"/>
+              <a:t>Data Acquisition and Data Engineering</a:t>
             </a:r>
           </a:p>
           <a:p>
             <a:pPr>
               <a:buFont typeface="Wingdings" panose="05000000000000000000" pitchFamily="2" charset="2"/>
-              <a:buChar char="§"/>
-            </a:pPr>
-            <a:r>
-              <a:rPr lang="en-US" sz="2400" dirty="0" smtClean="0">
-                <a:latin typeface="Times New Roman"/>
-                <a:cs typeface="Times New Roman"/>
-              </a:rPr>
-              <a:t>Conclusion and Future work </a:t>
+              <a:buChar char="v"/>
+            </a:pPr>
+            <a:r>
+              <a:rPr lang="en-US" sz="2600" dirty="0"/>
+              <a:t> Image Processing</a:t>
+            </a:r>
+          </a:p>
+          <a:p>
+            <a:pPr lvl="1">
+              <a:buFont typeface="Wingdings" panose="05000000000000000000" pitchFamily="2" charset="2"/>
+              <a:buChar char="Ø"/>
+            </a:pPr>
+            <a:r>
+              <a:rPr lang="en-US" sz="2600" dirty="0"/>
+              <a:t> SLIC</a:t>
+            </a:r>
+          </a:p>
+          <a:p>
+            <a:pPr lvl="1">
+              <a:buFont typeface="Wingdings" panose="05000000000000000000" pitchFamily="2" charset="2"/>
+              <a:buChar char="Ø"/>
+            </a:pPr>
+            <a:r>
+              <a:rPr lang="en-US" sz="2600" dirty="0"/>
+              <a:t> DBSCAN</a:t>
+            </a:r>
+          </a:p>
+          <a:p>
+            <a:pPr lvl="1">
+              <a:buFont typeface="Wingdings" panose="05000000000000000000" pitchFamily="2" charset="2"/>
+              <a:buChar char="Ø"/>
+            </a:pPr>
+            <a:r>
+              <a:rPr lang="en-US" sz="2600" dirty="0"/>
+              <a:t> Sobel filtering</a:t>
             </a:r>
           </a:p>
           <a:p>
             <a:pPr>
               <a:buFont typeface="Wingdings" panose="05000000000000000000" pitchFamily="2" charset="2"/>
-              <a:buChar char="§"/>
-            </a:pPr>
-            <a:r>
-              <a:rPr lang="en-US" sz="2400" dirty="0" smtClean="0">
-                <a:latin typeface="Times New Roman"/>
-                <a:cs typeface="Times New Roman"/>
-              </a:rPr>
-              <a:t>Poster</a:t>
-            </a:r>
-            <a:endParaRPr lang="en-US" sz="2400" dirty="0">
-              <a:latin typeface="Times New Roman"/>
-              <a:cs typeface="Times New Roman"/>
-            </a:endParaRPr>
+              <a:buChar char="v"/>
+            </a:pPr>
+            <a:r>
+              <a:rPr lang="en-US" sz="2600" dirty="0"/>
+              <a:t> Machine Learning</a:t>
+            </a:r>
+          </a:p>
+          <a:p>
+            <a:pPr lvl="1">
+              <a:buFont typeface="Wingdings" panose="05000000000000000000" pitchFamily="2" charset="2"/>
+              <a:buChar char="Ø"/>
+            </a:pPr>
+            <a:r>
+              <a:rPr lang="en-US" sz="2600" dirty="0"/>
+              <a:t> GUI</a:t>
+            </a:r>
+          </a:p>
+          <a:p>
+            <a:pPr lvl="1">
+              <a:buFont typeface="Wingdings" panose="05000000000000000000" pitchFamily="2" charset="2"/>
+              <a:buChar char="Ø"/>
+            </a:pPr>
+            <a:r>
+              <a:rPr lang="en-US" sz="2600" dirty="0"/>
+              <a:t> Supervised learning using SVM</a:t>
+            </a:r>
+          </a:p>
+          <a:p>
+            <a:pPr>
+              <a:buFont typeface="Wingdings" panose="05000000000000000000" pitchFamily="2" charset="2"/>
+              <a:buChar char="v"/>
+            </a:pPr>
+            <a:r>
+              <a:rPr lang="en-US" sz="2600" dirty="0"/>
+              <a:t> </a:t>
+            </a:r>
+            <a:r>
+              <a:rPr lang="en-US" sz="2600" dirty="0"/>
+              <a:t>Results</a:t>
+            </a:r>
+          </a:p>
+          <a:p>
+            <a:pPr>
+              <a:buFont typeface="Wingdings" panose="05000000000000000000" pitchFamily="2" charset="2"/>
+              <a:buChar char="v"/>
+            </a:pPr>
+            <a:r>
+              <a:rPr lang="en-US" sz="2600" dirty="0"/>
+              <a:t> Limitations</a:t>
+            </a:r>
+          </a:p>
+          <a:p>
+            <a:pPr>
+              <a:buFont typeface="Wingdings" panose="05000000000000000000" pitchFamily="2" charset="2"/>
+              <a:buChar char="v"/>
+            </a:pPr>
+            <a:r>
+              <a:rPr lang="en-US" sz="2600" dirty="0"/>
+              <a:t> Conclusion and Future Work </a:t>
+            </a:r>
+          </a:p>
+          <a:p>
+            <a:pPr>
+              <a:buFont typeface="Wingdings" panose="05000000000000000000" pitchFamily="2" charset="2"/>
+              <a:buChar char="v"/>
+            </a:pPr>
+            <a:r>
+              <a:rPr lang="en-US" sz="2600" dirty="0"/>
+              <a:t> Poster</a:t>
+            </a:r>
+            <a:endParaRPr lang="en-US" sz="2600" dirty="0"/>
           </a:p>
         </p:txBody>
       </p:sp>
@@ -4929,13 +6383,8 @@
             </a:pPr>
             <a:r>
               <a:rPr lang="en-US" sz="2000" dirty="0" smtClean="0"/>
-              <a:t>It’s really </a:t>
-            </a:r>
-            <a:r>
-              <a:rPr lang="en-US" sz="2000" smtClean="0"/>
-              <a:t>cool!!!</a:t>
-            </a:r>
-            <a:endParaRPr lang="en-US" sz="2000" dirty="0" smtClean="0"/>
+              <a:t>It’s really cool!!!</a:t>
+            </a:r>
           </a:p>
           <a:p>
             <a:pPr lvl="1">
@@ -5012,10 +6461,15 @@
             <p:ph idx="1"/>
           </p:nvPr>
         </p:nvSpPr>
-        <p:spPr/>
+        <p:spPr>
+          <a:xfrm>
+            <a:off x="822959" y="1845734"/>
+            <a:ext cx="7543801" cy="4478866"/>
+          </a:xfrm>
+        </p:spPr>
         <p:txBody>
           <a:bodyPr>
-            <a:normAutofit lnSpcReduction="10000"/>
+            <a:normAutofit/>
           </a:bodyPr>
           <a:lstStyle/>
           <a:p>
@@ -5034,6 +6488,7 @@
               <a:rPr lang="en-US" sz="2200" dirty="0" smtClean="0"/>
               <a:t>Yahoo-Flickr</a:t>
             </a:r>
+            <a:endParaRPr lang="en-US" sz="2000" dirty="0" smtClean="0"/>
           </a:p>
           <a:p>
             <a:pPr marL="754571" lvl="1" indent="-461963">
@@ -5043,7 +6498,67 @@
               <a:buFont typeface="Wingdings" charset="2"/>
               <a:buChar char="Ø"/>
             </a:pPr>
-            <a:endParaRPr lang="en-US" sz="2000" dirty="0" smtClean="0"/>
+            <a:r>
+              <a:rPr lang="en-US" sz="2000" dirty="0" smtClean="0"/>
+              <a:t>Image URL  (10 files, 5GB each)</a:t>
+            </a:r>
+          </a:p>
+          <a:p>
+            <a:pPr marL="937451" lvl="2" indent="-461963">
+              <a:lnSpc>
+                <a:spcPct val="100000"/>
+              </a:lnSpc>
+              <a:buFont typeface="Wingdings" charset="2"/>
+              <a:buChar char="ü"/>
+            </a:pPr>
+            <a:r>
+              <a:rPr lang="en-US" sz="1900" dirty="0"/>
+              <a:t>File contains image ID and the associated url to download the file</a:t>
+            </a:r>
+          </a:p>
+          <a:p>
+            <a:pPr marL="911225" lvl="2" indent="-436563">
+              <a:lnSpc>
+                <a:spcPct val="100000"/>
+              </a:lnSpc>
+              <a:buFont typeface="Wingdings" charset="2"/>
+              <a:buChar char="ü"/>
+            </a:pPr>
+            <a:r>
+              <a:rPr lang="en-US" sz="1900" dirty="0"/>
+              <a:t>~300,000 </a:t>
+            </a:r>
+            <a:r>
+              <a:rPr lang="en-US" sz="1900" dirty="0"/>
+              <a:t>images were </a:t>
+            </a:r>
+            <a:r>
+              <a:rPr lang="en-US" sz="1900" dirty="0"/>
+              <a:t>downloaded</a:t>
+            </a:r>
+          </a:p>
+          <a:p>
+            <a:pPr marL="911225" lvl="2" indent="-436563">
+              <a:lnSpc>
+                <a:spcPct val="100000"/>
+              </a:lnSpc>
+              <a:buFont typeface="Wingdings" charset="2"/>
+              <a:buChar char="ü"/>
+            </a:pPr>
+            <a:r>
+              <a:rPr lang="en-US" sz="1900" dirty="0"/>
+              <a:t>Small subset was used due to computational limitation</a:t>
+            </a:r>
+            <a:endParaRPr lang="en-US" sz="1900" dirty="0"/>
+          </a:p>
+          <a:p>
+            <a:pPr marL="475488" lvl="2" indent="0">
+              <a:lnSpc>
+                <a:spcPct val="100000"/>
+              </a:lnSpc>
+              <a:buNone/>
+            </a:pPr>
+            <a:endParaRPr lang="en-US" sz="1600" dirty="0" smtClean="0"/>
           </a:p>
           <a:p>
             <a:pPr marL="754571" lvl="1" indent="-461963">
@@ -5055,7 +6570,7 @@
             </a:pPr>
             <a:r>
               <a:rPr lang="en-US" sz="2000" dirty="0" smtClean="0"/>
-              <a:t>Image URL  (10 files, 5GB each)</a:t>
+              <a:t>Auto-tags (14GB)</a:t>
             </a:r>
           </a:p>
           <a:p>
@@ -5067,65 +6582,8 @@
               <a:buChar char="ü"/>
             </a:pPr>
             <a:r>
-              <a:rPr lang="en-US" sz="1600" dirty="0" smtClean="0"/>
-              <a:t>File contains image ID and the associated url to download the file</a:t>
-            </a:r>
-          </a:p>
-          <a:p>
-            <a:pPr marL="911225" lvl="2" indent="-436563">
-              <a:lnSpc>
-                <a:spcPct val="100000"/>
-              </a:lnSpc>
-              <a:buFont typeface="Wingdings" charset="2"/>
-              <a:buChar char="ü"/>
-            </a:pPr>
-            <a:r>
-              <a:rPr lang="en-US" sz="1600" dirty="0" smtClean="0"/>
-              <a:t>~300,000 </a:t>
-            </a:r>
-            <a:r>
-              <a:rPr lang="en-US" sz="1600" dirty="0"/>
-              <a:t>images were </a:t>
-            </a:r>
-            <a:r>
-              <a:rPr lang="en-US" sz="1600" dirty="0" smtClean="0"/>
-              <a:t>downloaded</a:t>
-            </a:r>
-          </a:p>
-          <a:p>
-            <a:pPr marL="911225" lvl="2" indent="-436563">
-              <a:lnSpc>
-                <a:spcPct val="100000"/>
-              </a:lnSpc>
-              <a:buFont typeface="Wingdings" charset="2"/>
-              <a:buChar char="ü"/>
-            </a:pPr>
-            <a:r>
-              <a:rPr lang="en-US" sz="1600" dirty="0" smtClean="0"/>
-              <a:t>Small subset was used due to computational limitation</a:t>
-            </a:r>
-            <a:endParaRPr lang="en-US" sz="1600" dirty="0"/>
-          </a:p>
-          <a:p>
-            <a:pPr marL="475488" lvl="2" indent="0">
-              <a:lnSpc>
-                <a:spcPct val="100000"/>
-              </a:lnSpc>
-              <a:buNone/>
-            </a:pPr>
-            <a:endParaRPr lang="en-US" sz="1600" dirty="0" smtClean="0"/>
-          </a:p>
-          <a:p>
-            <a:pPr marL="754571" lvl="1" indent="-461963">
-              <a:lnSpc>
-                <a:spcPct val="100000"/>
-              </a:lnSpc>
-              <a:buFont typeface="Wingdings" charset="2"/>
-              <a:buChar char="Ø"/>
-            </a:pPr>
-            <a:r>
-              <a:rPr lang="en-US" sz="2000" dirty="0" smtClean="0"/>
-              <a:t>Auto-tags (14GB)</a:t>
+              <a:rPr lang="en-US" sz="1800" dirty="0"/>
+              <a:t>File contains image ID and associated auto-tags</a:t>
             </a:r>
           </a:p>
           <a:p>
@@ -5137,8 +6595,8 @@
               <a:buChar char="ü"/>
             </a:pPr>
             <a:r>
-              <a:rPr lang="en-US" sz="1600" dirty="0" smtClean="0"/>
-              <a:t>File contains image ID and associated auto-tags</a:t>
+              <a:rPr lang="en-US" sz="1800" dirty="0"/>
+              <a:t>File was divided in two different files, because traditional processing was hard on such a large file</a:t>
             </a:r>
           </a:p>
           <a:p>
@@ -5150,20 +6608,7 @@
               <a:buChar char="ü"/>
             </a:pPr>
             <a:r>
-              <a:rPr lang="en-US" sz="1600" dirty="0" smtClean="0"/>
-              <a:t>File was divided in two different files, because traditional processing was hard on such a large file</a:t>
-            </a:r>
-          </a:p>
-          <a:p>
-            <a:pPr marL="937451" lvl="2" indent="-461963">
-              <a:lnSpc>
-                <a:spcPct val="100000"/>
-              </a:lnSpc>
-              <a:buFont typeface="Wingdings" charset="2"/>
-              <a:buChar char="ü"/>
-            </a:pPr>
-            <a:r>
-              <a:rPr lang="en-US" sz="1600" dirty="0" smtClean="0"/>
+              <a:rPr lang="en-US" sz="1800" dirty="0"/>
               <a:t>Index column was changed to auto-tags, now all the auto-tags are associated with the image ID</a:t>
             </a:r>
           </a:p>
@@ -5220,138 +6665,872 @@
         </p:nvSpPr>
         <p:spPr/>
         <p:txBody>
+          <a:bodyPr/>
+          <a:lstStyle/>
+          <a:p>
+            <a:r>
+              <a:rPr lang="en-US" dirty="0" smtClean="0"/>
+              <a:t>Image Processing</a:t>
+            </a:r>
+            <a:endParaRPr lang="en-US" dirty="0"/>
+          </a:p>
+        </p:txBody>
+      </p:sp>
+      <p:sp>
+        <p:nvSpPr>
+          <p:cNvPr id="3" name="Content Placeholder 2"/>
+          <p:cNvSpPr>
+            <a:spLocks noGrp="1"/>
+          </p:cNvSpPr>
+          <p:nvPr>
+            <p:ph idx="1"/>
+          </p:nvPr>
+        </p:nvSpPr>
+        <p:spPr/>
+        <p:txBody>
           <a:bodyPr>
-            <a:normAutofit fontScale="90000"/>
+            <a:normAutofit fontScale="77500" lnSpcReduction="20000"/>
           </a:bodyPr>
           <a:lstStyle/>
           <a:p>
-            <a:r>
-              <a:rPr lang="en-US" dirty="0" smtClean="0"/>
-              <a:t>Machine Learning – Supervised Learning Using SVM</a:t>
+            <a:pPr marL="461963" indent="-461963">
+              <a:lnSpc>
+                <a:spcPct val="150000"/>
+              </a:lnSpc>
+              <a:buFont typeface="Wingdings" charset="2"/>
+              <a:buChar char="v"/>
+            </a:pPr>
+            <a:r>
+              <a:rPr lang="en-US" sz="2400" dirty="0" smtClean="0"/>
+              <a:t>Must identify “</a:t>
+            </a:r>
+            <a:r>
+              <a:rPr lang="en-US" sz="2400" dirty="0" err="1" smtClean="0"/>
+              <a:t>taggable</a:t>
+            </a:r>
+            <a:r>
+              <a:rPr lang="en-US" sz="2400" dirty="0" smtClean="0"/>
+              <a:t>” regions in each image</a:t>
             </a:r>
             <a:endParaRPr lang="en-US" dirty="0"/>
           </a:p>
-        </p:txBody>
-      </p:sp>
-      <p:sp>
-        <p:nvSpPr>
-          <p:cNvPr id="3" name="Content Placeholder 2"/>
-          <p:cNvSpPr>
-            <a:spLocks noGrp="1"/>
-          </p:cNvSpPr>
-          <p:nvPr>
-            <p:ph idx="1"/>
-          </p:nvPr>
-        </p:nvSpPr>
-        <p:spPr/>
-        <p:txBody>
-          <a:bodyPr>
-            <a:normAutofit fontScale="92500" lnSpcReduction="10000"/>
-          </a:bodyPr>
-          <a:lstStyle/>
-          <a:p>
-            <a:pPr marL="251460" indent="-342900">
-              <a:buFont typeface="Wingdings" panose="05000000000000000000" pitchFamily="2" charset="2"/>
+          <a:p>
+            <a:pPr marL="911225" lvl="1" indent="-449263">
+              <a:lnSpc>
+                <a:spcPct val="150000"/>
+              </a:lnSpc>
+              <a:buFont typeface="Wingdings" charset="2"/>
+              <a:buChar char="Ø"/>
+            </a:pPr>
+            <a:r>
+              <a:rPr lang="en-US" sz="2000" dirty="0" smtClean="0"/>
+              <a:t>Otherwise incorrect data will be tagged</a:t>
+            </a:r>
+            <a:endParaRPr lang="en-US" sz="2000" dirty="0"/>
+          </a:p>
+          <a:p>
+            <a:pPr marL="461963" indent="-461963">
+              <a:lnSpc>
+                <a:spcPct val="150000"/>
+              </a:lnSpc>
+              <a:buFont typeface="Wingdings" charset="2"/>
               <a:buChar char="v"/>
             </a:pPr>
             <a:r>
-              <a:rPr lang="en-US" dirty="0" smtClean="0"/>
-              <a:t>SVM stands for Support Vector Machine</a:t>
-            </a:r>
-          </a:p>
-          <a:p>
-            <a:pPr marL="251460" indent="-342900">
-              <a:buFont typeface="Wingdings" panose="05000000000000000000" pitchFamily="2" charset="2"/>
+              <a:rPr lang="en-US" sz="2200" dirty="0" smtClean="0"/>
+              <a:t>Segmentation</a:t>
+            </a:r>
+            <a:endParaRPr lang="en-US" sz="2200" dirty="0"/>
+          </a:p>
+          <a:p>
+            <a:pPr marL="911225" lvl="1" indent="-450850">
+              <a:lnSpc>
+                <a:spcPct val="150000"/>
+              </a:lnSpc>
+              <a:buFont typeface="Wingdings" charset="2"/>
+              <a:buChar char="Ø"/>
+            </a:pPr>
+            <a:r>
+              <a:rPr lang="en-US" sz="2000" dirty="0" smtClean="0"/>
+              <a:t>Quantify different regions of each image</a:t>
+            </a:r>
+          </a:p>
+          <a:p>
+            <a:pPr marL="461963" indent="-461963">
+              <a:lnSpc>
+                <a:spcPct val="150000"/>
+              </a:lnSpc>
+              <a:buFont typeface="Wingdings" charset="2"/>
               <a:buChar char="v"/>
             </a:pPr>
             <a:r>
-              <a:rPr lang="en-US" dirty="0"/>
-              <a:t>Used SVM classification </a:t>
-            </a:r>
-            <a:r>
-              <a:rPr lang="en-US" dirty="0" smtClean="0"/>
-              <a:t>library </a:t>
-            </a:r>
-            <a:r>
-              <a:rPr lang="en-US" dirty="0"/>
-              <a:t>from </a:t>
-            </a:r>
-            <a:r>
-              <a:rPr lang="en-US" dirty="0" err="1" smtClean="0"/>
-              <a:t>scikit</a:t>
-            </a:r>
-            <a:r>
-              <a:rPr lang="en-US" smtClean="0"/>
-              <a:t>-learn </a:t>
+              <a:rPr lang="en-US" sz="2200" dirty="0" smtClean="0"/>
+              <a:t>Manual Tagging</a:t>
+            </a:r>
+            <a:endParaRPr lang="en-US" sz="2200" dirty="0"/>
+          </a:p>
+          <a:p>
+            <a:pPr marL="911225" lvl="1" indent="-450850">
+              <a:lnSpc>
+                <a:spcPct val="150000"/>
+              </a:lnSpc>
+              <a:buFont typeface="Wingdings" charset="2"/>
+              <a:buChar char="Ø"/>
+            </a:pPr>
+            <a:r>
+              <a:rPr lang="en-US" sz="2000" dirty="0" smtClean="0"/>
+              <a:t>Very difficult to algorithmically infer tags for each section of the image based on the training set</a:t>
+            </a:r>
+            <a:endParaRPr lang="en-US" sz="2200" dirty="0" smtClean="0"/>
+          </a:p>
+          <a:p>
+            <a:pPr marL="461963" indent="-461963">
+              <a:lnSpc>
+                <a:spcPct val="150000"/>
+              </a:lnSpc>
+              <a:buFont typeface="Wingdings" charset="2"/>
+              <a:buChar char="v"/>
+            </a:pPr>
+            <a:r>
+              <a:rPr lang="en-US" sz="2200" dirty="0" smtClean="0"/>
+              <a:t>Feature Vector Generation</a:t>
+            </a:r>
+            <a:endParaRPr lang="en-US" sz="2200" dirty="0"/>
+          </a:p>
+          <a:p>
+            <a:pPr marL="911225" lvl="1" indent="-450850">
+              <a:lnSpc>
+                <a:spcPct val="150000"/>
+              </a:lnSpc>
+              <a:buFont typeface="Wingdings" charset="2"/>
+              <a:buChar char="Ø"/>
+            </a:pPr>
+            <a:r>
+              <a:rPr lang="en-US" sz="2000" dirty="0" smtClean="0"/>
+              <a:t>Create a feature vector from a tagged cluster for every tagged image</a:t>
             </a:r>
             <a:endParaRPr lang="en-US" dirty="0"/>
           </a:p>
           <a:p>
-            <a:pPr marL="251460" indent="-342900">
-              <a:buFont typeface="Wingdings" panose="05000000000000000000" pitchFamily="2" charset="2"/>
+            <a:pPr marL="167767" indent="0">
+              <a:lnSpc>
+                <a:spcPct val="150000"/>
+              </a:lnSpc>
+              <a:buNone/>
+            </a:pPr>
+            <a:endParaRPr lang="en-US" dirty="0" smtClean="0"/>
+          </a:p>
+          <a:p>
+            <a:pPr marL="911225" lvl="1" indent="-450850">
+              <a:lnSpc>
+                <a:spcPct val="150000"/>
+              </a:lnSpc>
+              <a:buFont typeface="Wingdings" charset="2"/>
+              <a:buChar char="Ø"/>
+            </a:pPr>
+            <a:endParaRPr lang="en-US" dirty="0" smtClean="0"/>
+          </a:p>
+          <a:p>
+            <a:pPr marL="754571" lvl="1" indent="-461963">
+              <a:lnSpc>
+                <a:spcPct val="100000"/>
+              </a:lnSpc>
+              <a:buFont typeface="Wingdings" charset="2"/>
               <a:buChar char="v"/>
             </a:pPr>
-            <a:r>
-              <a:rPr lang="en-US" dirty="0" smtClean="0"/>
-              <a:t>This type of classification is based on feature vectors generated by processing  the segments in each image</a:t>
-            </a:r>
-          </a:p>
-          <a:p>
-            <a:pPr marL="251460" indent="-342900">
-              <a:buFont typeface="Wingdings" panose="05000000000000000000" pitchFamily="2" charset="2"/>
-              <a:buChar char="v"/>
-            </a:pPr>
-            <a:r>
-              <a:rPr lang="en-US" dirty="0" smtClean="0"/>
-              <a:t>The feature vector we used is a 1-D vector of numerical values representing a segment of an image</a:t>
-            </a:r>
-          </a:p>
-          <a:p>
-            <a:pPr marL="251460" indent="-342900">
-              <a:buFont typeface="Wingdings" panose="05000000000000000000" pitchFamily="2" charset="2"/>
-              <a:buChar char="v"/>
-            </a:pPr>
-            <a:r>
-              <a:rPr lang="en-US" dirty="0" smtClean="0"/>
-              <a:t>Each vector is associated with an image tag, e.g. “sky”</a:t>
-            </a:r>
-          </a:p>
-          <a:p>
-            <a:pPr marL="251460" indent="-342900">
-              <a:buFont typeface="Wingdings" panose="05000000000000000000" pitchFamily="2" charset="2"/>
-              <a:buChar char="v"/>
-            </a:pPr>
-            <a:r>
-              <a:rPr lang="en-US" dirty="0" smtClean="0"/>
-              <a:t>Using the feature vectors along with the labels for each tag, a machine learning model was created</a:t>
-            </a:r>
-          </a:p>
-          <a:p>
-            <a:pPr marL="251460" indent="-342900">
-              <a:buFont typeface="Wingdings" panose="05000000000000000000" pitchFamily="2" charset="2"/>
-              <a:buChar char="v"/>
-            </a:pPr>
-            <a:r>
-              <a:rPr lang="en-US" dirty="0" smtClean="0"/>
-              <a:t>This model was then used to predict what tags the new image could have</a:t>
-            </a:r>
-          </a:p>
-          <a:p>
-            <a:pPr marL="251460" indent="-342900">
-              <a:buFont typeface="Wingdings" panose="05000000000000000000" pitchFamily="2" charset="2"/>
-              <a:buChar char="v"/>
-            </a:pPr>
-            <a:r>
-              <a:rPr lang="en-US" dirty="0" smtClean="0"/>
-              <a:t>The SVM provided tags and probabilities associated with each tag</a:t>
-            </a:r>
+            <a:endParaRPr lang="en-US" dirty="0"/>
           </a:p>
         </p:txBody>
       </p:sp>
     </p:spTree>
     <p:extLst>
       <p:ext uri="{BB962C8B-B14F-4D97-AF65-F5344CB8AC3E}">
-        <p14:creationId xmlns:p14="http://schemas.microsoft.com/office/powerpoint/2010/main" val="3160203011"/>
+        <p14:creationId xmlns:p14="http://schemas.microsoft.com/office/powerpoint/2010/main" val="2426746770"/>
+      </p:ext>
+    </p:extLst>
+  </p:cSld>
+  <p:clrMapOvr>
+    <a:masterClrMapping/>
+  </p:clrMapOvr>
+</p:sld>
+</file>
+
+<file path=ppt/slides/slide6.xml><?xml version="1.0" encoding="utf-8"?>
+<p:sld xmlns:a="http://schemas.openxmlformats.org/drawingml/2006/main" xmlns:r="http://schemas.openxmlformats.org/officeDocument/2006/relationships" xmlns:p="http://schemas.openxmlformats.org/presentationml/2006/main">
+  <p:cSld>
+    <p:spTree>
+      <p:nvGrpSpPr>
+        <p:cNvPr id="1" name=""/>
+        <p:cNvGrpSpPr/>
+        <p:nvPr/>
+      </p:nvGrpSpPr>
+      <p:grpSpPr>
+        <a:xfrm>
+          <a:off x="0" y="0"/>
+          <a:ext cx="0" cy="0"/>
+          <a:chOff x="0" y="0"/>
+          <a:chExt cx="0" cy="0"/>
+        </a:xfrm>
+      </p:grpSpPr>
+      <p:sp>
+        <p:nvSpPr>
+          <p:cNvPr id="2" name="Title 1"/>
+          <p:cNvSpPr>
+            <a:spLocks noGrp="1"/>
+          </p:cNvSpPr>
+          <p:nvPr>
+            <p:ph type="title"/>
+          </p:nvPr>
+        </p:nvSpPr>
+        <p:spPr/>
+        <p:txBody>
+          <a:bodyPr/>
+          <a:lstStyle/>
+          <a:p>
+            <a:r>
+              <a:rPr lang="en-US" dirty="0" smtClean="0"/>
+              <a:t>Segmentation - SLIC</a:t>
+            </a:r>
+            <a:endParaRPr lang="en-US" dirty="0"/>
+          </a:p>
+        </p:txBody>
+      </p:sp>
+      <p:sp>
+        <p:nvSpPr>
+          <p:cNvPr id="3" name="Content Placeholder 2"/>
+          <p:cNvSpPr>
+            <a:spLocks noGrp="1"/>
+          </p:cNvSpPr>
+          <p:nvPr>
+            <p:ph sz="half" idx="2"/>
+          </p:nvPr>
+        </p:nvSpPr>
+        <p:spPr>
+          <a:xfrm>
+            <a:off x="822960" y="2133600"/>
+            <a:ext cx="3703320" cy="3735494"/>
+          </a:xfrm>
+        </p:spPr>
+        <p:txBody>
+          <a:bodyPr>
+            <a:normAutofit fontScale="62500" lnSpcReduction="20000"/>
+          </a:bodyPr>
+          <a:lstStyle/>
+          <a:p>
+            <a:pPr marL="461963" indent="-461963">
+              <a:lnSpc>
+                <a:spcPct val="150000"/>
+              </a:lnSpc>
+              <a:buFont typeface="Wingdings" charset="2"/>
+              <a:buChar char="v"/>
+            </a:pPr>
+            <a:r>
+              <a:rPr lang="en-US" sz="2400" dirty="0" smtClean="0"/>
+              <a:t>Simple Linear Iterative Clustering (SLIC)</a:t>
+            </a:r>
+            <a:endParaRPr lang="en-US" dirty="0"/>
+          </a:p>
+          <a:p>
+            <a:pPr marL="911225" lvl="1" indent="-449263">
+              <a:lnSpc>
+                <a:spcPct val="150000"/>
+              </a:lnSpc>
+              <a:buFont typeface="Wingdings" charset="2"/>
+              <a:buChar char="Ø"/>
+            </a:pPr>
+            <a:r>
+              <a:rPr lang="en-US" sz="2000" dirty="0" smtClean="0"/>
+              <a:t>Groups pixels in an image into “</a:t>
+            </a:r>
+            <a:r>
+              <a:rPr lang="en-US" sz="2000" dirty="0" err="1" smtClean="0"/>
+              <a:t>superpixels</a:t>
+            </a:r>
+            <a:r>
+              <a:rPr lang="en-US" sz="2000" dirty="0" smtClean="0"/>
+              <a:t>”</a:t>
+            </a:r>
+            <a:endParaRPr lang="en-US" sz="2000" dirty="0"/>
+          </a:p>
+          <a:p>
+            <a:pPr marL="461963" indent="-461963">
+              <a:lnSpc>
+                <a:spcPct val="150000"/>
+              </a:lnSpc>
+              <a:buFont typeface="Wingdings" charset="2"/>
+              <a:buChar char="v"/>
+            </a:pPr>
+            <a:r>
+              <a:rPr lang="en-US" sz="2200" dirty="0" smtClean="0"/>
+              <a:t>Helps to easily quantify groups of similar pixels</a:t>
+            </a:r>
+            <a:endParaRPr lang="en-US" sz="2200" dirty="0"/>
+          </a:p>
+          <a:p>
+            <a:pPr marL="461963" indent="-461963">
+              <a:lnSpc>
+                <a:spcPct val="150000"/>
+              </a:lnSpc>
+              <a:buFont typeface="Wingdings" charset="2"/>
+              <a:buChar char="v"/>
+            </a:pPr>
+            <a:r>
+              <a:rPr lang="en-US" sz="2200" dirty="0" smtClean="0"/>
+              <a:t>4-D vector </a:t>
+            </a:r>
+            <a:r>
+              <a:rPr lang="en-US" sz="2200" dirty="0" err="1" smtClean="0"/>
+              <a:t>superpixel</a:t>
+            </a:r>
+            <a:r>
+              <a:rPr lang="en-US" sz="2200" dirty="0" smtClean="0"/>
+              <a:t> quantification</a:t>
+            </a:r>
+            <a:endParaRPr lang="en-US" sz="2200" dirty="0"/>
+          </a:p>
+          <a:p>
+            <a:pPr marL="911225" lvl="1" indent="-450850">
+              <a:lnSpc>
+                <a:spcPct val="150000"/>
+              </a:lnSpc>
+              <a:buFont typeface="Wingdings" charset="2"/>
+              <a:buChar char="Ø"/>
+            </a:pPr>
+            <a:r>
+              <a:rPr lang="en-US" sz="2000" dirty="0" smtClean="0"/>
+              <a:t>Create a 4-D vector for each </a:t>
+            </a:r>
+            <a:r>
+              <a:rPr lang="en-US" sz="2000" dirty="0" err="1" smtClean="0"/>
+              <a:t>superpixel</a:t>
+            </a:r>
+            <a:r>
+              <a:rPr lang="en-US" sz="2000" dirty="0" smtClean="0"/>
+              <a:t> which contains mean values for each color channel and  mean edge response</a:t>
+            </a:r>
+            <a:endParaRPr lang="en-US" sz="2200" dirty="0"/>
+          </a:p>
+          <a:p>
+            <a:endParaRPr lang="en-US" dirty="0"/>
+          </a:p>
+        </p:txBody>
+      </p:sp>
+      <p:pic>
+        <p:nvPicPr>
+          <p:cNvPr id="8" name="Content Placeholder 7"/>
+          <p:cNvPicPr>
+            <a:picLocks noGrp="1" noChangeAspect="1"/>
+          </p:cNvPicPr>
+          <p:nvPr>
+            <p:ph sz="quarter" idx="4"/>
+          </p:nvPr>
+        </p:nvPicPr>
+        <p:blipFill>
+          <a:blip r:embed="rId2">
+            <a:extLst>
+              <a:ext uri="{28A0092B-C50C-407E-A947-70E740481C1C}">
+                <a14:useLocalDpi xmlns:a14="http://schemas.microsoft.com/office/drawing/2010/main" val="0"/>
+              </a:ext>
+            </a:extLst>
+          </a:blip>
+          <a:stretch>
+            <a:fillRect/>
+          </a:stretch>
+        </p:blipFill>
+        <p:spPr>
+          <a:xfrm>
+            <a:off x="5105400" y="4077407"/>
+            <a:ext cx="2979615" cy="1971888"/>
+          </a:xfrm>
+        </p:spPr>
+      </p:pic>
+      <p:pic>
+        <p:nvPicPr>
+          <p:cNvPr id="9" name="Picture 8"/>
+          <p:cNvPicPr>
+            <a:picLocks noChangeAspect="1"/>
+          </p:cNvPicPr>
+          <p:nvPr/>
+        </p:nvPicPr>
+        <p:blipFill>
+          <a:blip r:embed="rId3">
+            <a:extLst>
+              <a:ext uri="{28A0092B-C50C-407E-A947-70E740481C1C}">
+                <a14:useLocalDpi xmlns:a14="http://schemas.microsoft.com/office/drawing/2010/main" val="0"/>
+              </a:ext>
+            </a:extLst>
+          </a:blip>
+          <a:stretch>
+            <a:fillRect/>
+          </a:stretch>
+        </p:blipFill>
+        <p:spPr>
+          <a:xfrm>
+            <a:off x="5105399" y="1799797"/>
+            <a:ext cx="2979615" cy="2234712"/>
+          </a:xfrm>
+          <a:prstGeom prst="rect">
+            <a:avLst/>
+          </a:prstGeom>
+        </p:spPr>
+      </p:pic>
+    </p:spTree>
+    <p:extLst>
+      <p:ext uri="{BB962C8B-B14F-4D97-AF65-F5344CB8AC3E}">
+        <p14:creationId xmlns:p14="http://schemas.microsoft.com/office/powerpoint/2010/main" val="1379218759"/>
+      </p:ext>
+    </p:extLst>
+  </p:cSld>
+  <p:clrMapOvr>
+    <a:masterClrMapping/>
+  </p:clrMapOvr>
+</p:sld>
+</file>
+
+<file path=ppt/slides/slide7.xml><?xml version="1.0" encoding="utf-8"?>
+<p:sld xmlns:a="http://schemas.openxmlformats.org/drawingml/2006/main" xmlns:r="http://schemas.openxmlformats.org/officeDocument/2006/relationships" xmlns:p="http://schemas.openxmlformats.org/presentationml/2006/main">
+  <p:cSld>
+    <p:spTree>
+      <p:nvGrpSpPr>
+        <p:cNvPr id="1" name=""/>
+        <p:cNvGrpSpPr/>
+        <p:nvPr/>
+      </p:nvGrpSpPr>
+      <p:grpSpPr>
+        <a:xfrm>
+          <a:off x="0" y="0"/>
+          <a:ext cx="0" cy="0"/>
+          <a:chOff x="0" y="0"/>
+          <a:chExt cx="0" cy="0"/>
+        </a:xfrm>
+      </p:grpSpPr>
+      <p:sp>
+        <p:nvSpPr>
+          <p:cNvPr id="2" name="Title 1"/>
+          <p:cNvSpPr>
+            <a:spLocks noGrp="1"/>
+          </p:cNvSpPr>
+          <p:nvPr>
+            <p:ph type="title"/>
+          </p:nvPr>
+        </p:nvSpPr>
+        <p:spPr/>
+        <p:txBody>
+          <a:bodyPr/>
+          <a:lstStyle/>
+          <a:p>
+            <a:r>
+              <a:rPr lang="en-US" dirty="0" smtClean="0"/>
+              <a:t>Segmentation - DBSCAN</a:t>
+            </a:r>
+            <a:endParaRPr lang="en-US" dirty="0"/>
+          </a:p>
+        </p:txBody>
+      </p:sp>
+      <p:sp>
+        <p:nvSpPr>
+          <p:cNvPr id="3" name="Content Placeholder 2"/>
+          <p:cNvSpPr>
+            <a:spLocks noGrp="1"/>
+          </p:cNvSpPr>
+          <p:nvPr>
+            <p:ph sz="half" idx="2"/>
+          </p:nvPr>
+        </p:nvSpPr>
+        <p:spPr>
+          <a:xfrm>
+            <a:off x="822960" y="2133600"/>
+            <a:ext cx="3703320" cy="3735494"/>
+          </a:xfrm>
+        </p:spPr>
+        <p:txBody>
+          <a:bodyPr>
+            <a:normAutofit fontScale="70000" lnSpcReduction="20000"/>
+          </a:bodyPr>
+          <a:lstStyle/>
+          <a:p>
+            <a:pPr marL="461963" indent="-461963">
+              <a:lnSpc>
+                <a:spcPct val="150000"/>
+              </a:lnSpc>
+              <a:buFont typeface="Wingdings" charset="2"/>
+              <a:buChar char="v"/>
+            </a:pPr>
+            <a:r>
+              <a:rPr lang="en-US" sz="2400" dirty="0"/>
+              <a:t>Density-based spatial clustering of applications with </a:t>
+            </a:r>
+            <a:r>
+              <a:rPr lang="en-US" sz="2400" dirty="0" smtClean="0"/>
+              <a:t>noise (DBSCAN)</a:t>
+            </a:r>
+            <a:endParaRPr lang="en-US" dirty="0"/>
+          </a:p>
+          <a:p>
+            <a:pPr marL="461962" lvl="1" indent="0">
+              <a:lnSpc>
+                <a:spcPct val="150000"/>
+              </a:lnSpc>
+              <a:buNone/>
+            </a:pPr>
+            <a:r>
+              <a:rPr lang="en-US" sz="2000" dirty="0" smtClean="0"/>
+              <a:t>	Clusters </a:t>
+            </a:r>
+            <a:r>
+              <a:rPr lang="en-US" sz="2000" dirty="0" smtClean="0"/>
+              <a:t>data points based on density</a:t>
+            </a:r>
+            <a:endParaRPr lang="en-US" sz="2000" dirty="0"/>
+          </a:p>
+          <a:p>
+            <a:pPr marL="461963" indent="-461963">
+              <a:lnSpc>
+                <a:spcPct val="150000"/>
+              </a:lnSpc>
+              <a:buFont typeface="Wingdings" charset="2"/>
+              <a:buChar char="v"/>
+            </a:pPr>
+            <a:r>
+              <a:rPr lang="en-US" sz="2200" dirty="0" smtClean="0"/>
+              <a:t>Only clusters </a:t>
+            </a:r>
+            <a:r>
+              <a:rPr lang="en-US" sz="2200" dirty="0" err="1" smtClean="0"/>
+              <a:t>superpixels</a:t>
+            </a:r>
+            <a:r>
+              <a:rPr lang="en-US" sz="2200" dirty="0" smtClean="0"/>
+              <a:t> that are “similar enough” and throws away the others</a:t>
+            </a:r>
+            <a:endParaRPr lang="en-US" sz="2200" dirty="0"/>
+          </a:p>
+          <a:p>
+            <a:pPr marL="461963" indent="-461963">
+              <a:lnSpc>
+                <a:spcPct val="150000"/>
+              </a:lnSpc>
+              <a:buFont typeface="Wingdings" charset="2"/>
+              <a:buChar char="v"/>
+            </a:pPr>
+            <a:r>
+              <a:rPr lang="en-US" sz="2200" dirty="0" smtClean="0"/>
+              <a:t>Used to generate unique layers in each image</a:t>
+            </a:r>
+            <a:endParaRPr lang="en-US" sz="2200" dirty="0"/>
+          </a:p>
+          <a:p>
+            <a:endParaRPr lang="en-US" dirty="0"/>
+          </a:p>
+        </p:txBody>
+      </p:sp>
+      <p:pic>
+        <p:nvPicPr>
+          <p:cNvPr id="9" name="Picture 8"/>
+          <p:cNvPicPr>
+            <a:picLocks noChangeAspect="1"/>
+          </p:cNvPicPr>
+          <p:nvPr/>
+        </p:nvPicPr>
+        <p:blipFill>
+          <a:blip r:embed="rId2">
+            <a:extLst>
+              <a:ext uri="{28A0092B-C50C-407E-A947-70E740481C1C}">
+                <a14:useLocalDpi xmlns:a14="http://schemas.microsoft.com/office/drawing/2010/main" val="0"/>
+              </a:ext>
+            </a:extLst>
+          </a:blip>
+          <a:stretch>
+            <a:fillRect/>
+          </a:stretch>
+        </p:blipFill>
+        <p:spPr>
+          <a:xfrm>
+            <a:off x="5105399" y="1799797"/>
+            <a:ext cx="2979615" cy="2234712"/>
+          </a:xfrm>
+          <a:prstGeom prst="rect">
+            <a:avLst/>
+          </a:prstGeom>
+        </p:spPr>
+      </p:pic>
+      <p:pic>
+        <p:nvPicPr>
+          <p:cNvPr id="4" name="Picture 3"/>
+          <p:cNvPicPr>
+            <a:picLocks noChangeAspect="1"/>
+          </p:cNvPicPr>
+          <p:nvPr/>
+        </p:nvPicPr>
+        <p:blipFill>
+          <a:blip r:embed="rId3">
+            <a:extLst>
+              <a:ext uri="{28A0092B-C50C-407E-A947-70E740481C1C}">
+                <a14:useLocalDpi xmlns:a14="http://schemas.microsoft.com/office/drawing/2010/main" val="0"/>
+              </a:ext>
+            </a:extLst>
+          </a:blip>
+          <a:stretch>
+            <a:fillRect/>
+          </a:stretch>
+        </p:blipFill>
+        <p:spPr>
+          <a:xfrm>
+            <a:off x="5105399" y="4091083"/>
+            <a:ext cx="2979615" cy="1928717"/>
+          </a:xfrm>
+          <a:prstGeom prst="rect">
+            <a:avLst/>
+          </a:prstGeom>
+        </p:spPr>
+      </p:pic>
+    </p:spTree>
+    <p:extLst>
+      <p:ext uri="{BB962C8B-B14F-4D97-AF65-F5344CB8AC3E}">
+        <p14:creationId xmlns:p14="http://schemas.microsoft.com/office/powerpoint/2010/main" val="1301484548"/>
+      </p:ext>
+    </p:extLst>
+  </p:cSld>
+  <p:clrMapOvr>
+    <a:masterClrMapping/>
+  </p:clrMapOvr>
+</p:sld>
+</file>
+
+<file path=ppt/slides/slide8.xml><?xml version="1.0" encoding="utf-8"?>
+<p:sld xmlns:a="http://schemas.openxmlformats.org/drawingml/2006/main" xmlns:r="http://schemas.openxmlformats.org/officeDocument/2006/relationships" xmlns:p="http://schemas.openxmlformats.org/presentationml/2006/main">
+  <p:cSld>
+    <p:spTree>
+      <p:nvGrpSpPr>
+        <p:cNvPr id="1" name=""/>
+        <p:cNvGrpSpPr/>
+        <p:nvPr/>
+      </p:nvGrpSpPr>
+      <p:grpSpPr>
+        <a:xfrm>
+          <a:off x="0" y="0"/>
+          <a:ext cx="0" cy="0"/>
+          <a:chOff x="0" y="0"/>
+          <a:chExt cx="0" cy="0"/>
+        </a:xfrm>
+      </p:grpSpPr>
+      <p:sp>
+        <p:nvSpPr>
+          <p:cNvPr id="2" name="Title 1"/>
+          <p:cNvSpPr>
+            <a:spLocks noGrp="1"/>
+          </p:cNvSpPr>
+          <p:nvPr>
+            <p:ph type="title"/>
+          </p:nvPr>
+        </p:nvSpPr>
+        <p:spPr/>
+        <p:txBody>
+          <a:bodyPr/>
+          <a:lstStyle/>
+          <a:p>
+            <a:r>
+              <a:rPr lang="en-US" dirty="0" smtClean="0"/>
+              <a:t>Segmentation - DBSCAN</a:t>
+            </a:r>
+            <a:endParaRPr lang="en-US" dirty="0"/>
+          </a:p>
+        </p:txBody>
+      </p:sp>
+      <p:pic>
+        <p:nvPicPr>
+          <p:cNvPr id="7" name="Picture 6"/>
+          <p:cNvPicPr>
+            <a:picLocks noChangeAspect="1"/>
+          </p:cNvPicPr>
+          <p:nvPr/>
+        </p:nvPicPr>
+        <p:blipFill>
+          <a:blip r:embed="rId2">
+            <a:extLst>
+              <a:ext uri="{28A0092B-C50C-407E-A947-70E740481C1C}">
+                <a14:useLocalDpi xmlns:a14="http://schemas.microsoft.com/office/drawing/2010/main" val="0"/>
+              </a:ext>
+            </a:extLst>
+          </a:blip>
+          <a:stretch>
+            <a:fillRect/>
+          </a:stretch>
+        </p:blipFill>
+        <p:spPr>
+          <a:xfrm>
+            <a:off x="1520186" y="1781823"/>
+            <a:ext cx="5947414" cy="4487925"/>
+          </a:xfrm>
+          <a:prstGeom prst="rect">
+            <a:avLst/>
+          </a:prstGeom>
+        </p:spPr>
+      </p:pic>
+      <p:sp>
+        <p:nvSpPr>
+          <p:cNvPr id="8" name="TextBox 7"/>
+          <p:cNvSpPr txBox="1"/>
+          <p:nvPr/>
+        </p:nvSpPr>
+        <p:spPr>
+          <a:xfrm>
+            <a:off x="2971800" y="1828800"/>
+            <a:ext cx="3505200" cy="646331"/>
+          </a:xfrm>
+          <a:prstGeom prst="rect">
+            <a:avLst/>
+          </a:prstGeom>
+          <a:noFill/>
+        </p:spPr>
+        <p:txBody>
+          <a:bodyPr wrap="square" rtlCol="0">
+            <a:spAutoFit/>
+          </a:bodyPr>
+          <a:lstStyle/>
+          <a:p>
+            <a:r>
+              <a:rPr lang="en-US" dirty="0" smtClean="0"/>
+              <a:t>Graph of DBSCAN clustering results using Lab color channels</a:t>
+            </a:r>
+            <a:endParaRPr lang="en-US" dirty="0"/>
+          </a:p>
+        </p:txBody>
+      </p:sp>
+    </p:spTree>
+    <p:extLst>
+      <p:ext uri="{BB962C8B-B14F-4D97-AF65-F5344CB8AC3E}">
+        <p14:creationId xmlns:p14="http://schemas.microsoft.com/office/powerpoint/2010/main" val="963229489"/>
+      </p:ext>
+    </p:extLst>
+  </p:cSld>
+  <p:clrMapOvr>
+    <a:masterClrMapping/>
+  </p:clrMapOvr>
+</p:sld>
+</file>
+
+<file path=ppt/slides/slide9.xml><?xml version="1.0" encoding="utf-8"?>
+<p:sld xmlns:a="http://schemas.openxmlformats.org/drawingml/2006/main" xmlns:r="http://schemas.openxmlformats.org/officeDocument/2006/relationships" xmlns:p="http://schemas.openxmlformats.org/presentationml/2006/main">
+  <p:cSld>
+    <p:spTree>
+      <p:nvGrpSpPr>
+        <p:cNvPr id="1" name=""/>
+        <p:cNvGrpSpPr/>
+        <p:nvPr/>
+      </p:nvGrpSpPr>
+      <p:grpSpPr>
+        <a:xfrm>
+          <a:off x="0" y="0"/>
+          <a:ext cx="0" cy="0"/>
+          <a:chOff x="0" y="0"/>
+          <a:chExt cx="0" cy="0"/>
+        </a:xfrm>
+      </p:grpSpPr>
+      <p:sp>
+        <p:nvSpPr>
+          <p:cNvPr id="2" name="Title 1"/>
+          <p:cNvSpPr>
+            <a:spLocks noGrp="1"/>
+          </p:cNvSpPr>
+          <p:nvPr>
+            <p:ph type="title"/>
+          </p:nvPr>
+        </p:nvSpPr>
+        <p:spPr/>
+        <p:txBody>
+          <a:bodyPr/>
+          <a:lstStyle/>
+          <a:p>
+            <a:r>
+              <a:rPr lang="en-US" dirty="0" smtClean="0"/>
+              <a:t>Manual Tagging</a:t>
+            </a:r>
+            <a:endParaRPr lang="en-US" dirty="0"/>
+          </a:p>
+        </p:txBody>
+      </p:sp>
+      <p:sp>
+        <p:nvSpPr>
+          <p:cNvPr id="3" name="Content Placeholder 2"/>
+          <p:cNvSpPr>
+            <a:spLocks noGrp="1"/>
+          </p:cNvSpPr>
+          <p:nvPr>
+            <p:ph idx="1"/>
+          </p:nvPr>
+        </p:nvSpPr>
+        <p:spPr/>
+        <p:txBody>
+          <a:bodyPr>
+            <a:normAutofit/>
+          </a:bodyPr>
+          <a:lstStyle/>
+          <a:p>
+            <a:pPr marL="461963" indent="-461963">
+              <a:lnSpc>
+                <a:spcPct val="150000"/>
+              </a:lnSpc>
+              <a:buFont typeface="Wingdings" charset="2"/>
+              <a:buChar char="v"/>
+            </a:pPr>
+            <a:r>
+              <a:rPr lang="en-US" sz="2400" dirty="0" smtClean="0"/>
+              <a:t>Tagging GUI</a:t>
+            </a:r>
+            <a:endParaRPr lang="en-US" dirty="0"/>
+          </a:p>
+          <a:p>
+            <a:pPr marL="911225" lvl="1" indent="-449263">
+              <a:lnSpc>
+                <a:spcPct val="150000"/>
+              </a:lnSpc>
+              <a:buFont typeface="Wingdings" charset="2"/>
+              <a:buChar char="Ø"/>
+            </a:pPr>
+            <a:r>
+              <a:rPr lang="en-US" sz="2000" dirty="0" smtClean="0"/>
+              <a:t>Used for manual tagging of ~900 images to build a training set</a:t>
+            </a:r>
+            <a:endParaRPr lang="en-US" sz="2000" dirty="0"/>
+          </a:p>
+          <a:p>
+            <a:pPr marL="461963" indent="-461963">
+              <a:lnSpc>
+                <a:spcPct val="150000"/>
+              </a:lnSpc>
+              <a:buFont typeface="Wingdings" charset="2"/>
+              <a:buChar char="v"/>
+            </a:pPr>
+            <a:r>
+              <a:rPr lang="en-US" sz="2200" dirty="0" smtClean="0"/>
+              <a:t>Associates a point in an image with a tag</a:t>
+            </a:r>
+            <a:endParaRPr lang="en-US" sz="2200" dirty="0"/>
+          </a:p>
+          <a:p>
+            <a:pPr marL="461963" indent="-461963">
+              <a:lnSpc>
+                <a:spcPct val="150000"/>
+              </a:lnSpc>
+              <a:buFont typeface="Wingdings" charset="2"/>
+              <a:buChar char="v"/>
+            </a:pPr>
+            <a:r>
+              <a:rPr lang="en-US" sz="2200" dirty="0" smtClean="0"/>
+              <a:t>Code later associates the point with a layer</a:t>
+            </a:r>
+            <a:endParaRPr lang="en-US" sz="2200" dirty="0"/>
+          </a:p>
+          <a:p>
+            <a:endParaRPr lang="en-US" dirty="0"/>
+          </a:p>
+        </p:txBody>
+      </p:sp>
+    </p:spTree>
+    <p:extLst>
+      <p:ext uri="{BB962C8B-B14F-4D97-AF65-F5344CB8AC3E}">
+        <p14:creationId xmlns:p14="http://schemas.microsoft.com/office/powerpoint/2010/main" val="2987984225"/>
       </p:ext>
     </p:extLst>
   </p:cSld>

</xml_diff>